<commit_message>
add data test, update slide, add Project-optimal-CP.py
</commit_message>
<xml_diff>
--- a/project.pptx
+++ b/project.pptx
@@ -5,7 +5,7 @@
     <p:sldMasterId id="2147483648" r:id="rId1"/>
   </p:sldMasterIdLst>
   <p:notesMasterIdLst>
-    <p:notesMasterId r:id="rId9"/>
+    <p:notesMasterId r:id="rId12"/>
   </p:notesMasterIdLst>
   <p:sldIdLst>
     <p:sldId id="256" r:id="rId2"/>
@@ -15,6 +15,9 @@
     <p:sldId id="303" r:id="rId6"/>
     <p:sldId id="304" r:id="rId7"/>
     <p:sldId id="305" r:id="rId8"/>
+    <p:sldId id="307" r:id="rId9"/>
+    <p:sldId id="308" r:id="rId10"/>
+    <p:sldId id="309" r:id="rId11"/>
   </p:sldIdLst>
   <p:sldSz cx="12192000" cy="6858000"/>
   <p:notesSz cx="6858000" cy="9144000"/>
@@ -203,7 +206,7 @@
           <a:p>
             <a:fld id="{96F24957-8CAA-48B8-845F-4771C4C8EBBD}" type="datetimeFigureOut">
               <a:rPr lang="en-US" smtClean="0"/>
-              <a:t>5/14/2021</a:t>
+              <a:t>5/16/2021</a:t>
             </a:fld>
             <a:endParaRPr lang="en-US"/>
           </a:p>
@@ -975,6 +978,258 @@
 </p:notes>
 </file>
 
+<file path=ppt/notesSlides/notesSlide7.xml><?xml version="1.0" encoding="utf-8"?>
+<p:notes xmlns:a="http://schemas.openxmlformats.org/drawingml/2006/main" xmlns:r="http://schemas.openxmlformats.org/officeDocument/2006/relationships" xmlns:p="http://schemas.openxmlformats.org/presentationml/2006/main">
+  <p:cSld>
+    <p:spTree>
+      <p:nvGrpSpPr>
+        <p:cNvPr id="1" name=""/>
+        <p:cNvGrpSpPr/>
+        <p:nvPr/>
+      </p:nvGrpSpPr>
+      <p:grpSpPr>
+        <a:xfrm>
+          <a:off x="0" y="0"/>
+          <a:ext cx="0" cy="0"/>
+          <a:chOff x="0" y="0"/>
+          <a:chExt cx="0" cy="0"/>
+        </a:xfrm>
+      </p:grpSpPr>
+      <p:sp>
+        <p:nvSpPr>
+          <p:cNvPr id="2" name="Slide Image Placeholder 1"/>
+          <p:cNvSpPr>
+            <a:spLocks noGrp="1" noRot="1" noChangeAspect="1"/>
+          </p:cNvSpPr>
+          <p:nvPr>
+            <p:ph type="sldImg"/>
+          </p:nvPr>
+        </p:nvSpPr>
+        <p:spPr/>
+      </p:sp>
+      <p:sp>
+        <p:nvSpPr>
+          <p:cNvPr id="3" name="Notes Placeholder 2"/>
+          <p:cNvSpPr>
+            <a:spLocks noGrp="1"/>
+          </p:cNvSpPr>
+          <p:nvPr>
+            <p:ph type="body" idx="1"/>
+          </p:nvPr>
+        </p:nvSpPr>
+        <p:spPr/>
+        <p:txBody>
+          <a:bodyPr/>
+          <a:lstStyle/>
+          <a:p>
+            <a:endParaRPr lang="en-GB"/>
+          </a:p>
+        </p:txBody>
+      </p:sp>
+      <p:sp>
+        <p:nvSpPr>
+          <p:cNvPr id="4" name="Slide Number Placeholder 3"/>
+          <p:cNvSpPr>
+            <a:spLocks noGrp="1"/>
+          </p:cNvSpPr>
+          <p:nvPr>
+            <p:ph type="sldNum" sz="quarter" idx="10"/>
+          </p:nvPr>
+        </p:nvSpPr>
+        <p:spPr/>
+        <p:txBody>
+          <a:bodyPr/>
+          <a:lstStyle/>
+          <a:p>
+            <a:fld id="{C7CBB773-B53D-41B7-9A3B-E6071C122DB3}" type="slidenum">
+              <a:rPr lang="en-GB" smtClean="0"/>
+              <a:t>8</a:t>
+            </a:fld>
+            <a:endParaRPr lang="en-GB"/>
+          </a:p>
+        </p:txBody>
+      </p:sp>
+    </p:spTree>
+    <p:extLst>
+      <p:ext uri="{BB962C8B-B14F-4D97-AF65-F5344CB8AC3E}">
+        <p14:creationId xmlns:p14="http://schemas.microsoft.com/office/powerpoint/2010/main" val="2174080009"/>
+      </p:ext>
+    </p:extLst>
+  </p:cSld>
+  <p:clrMapOvr>
+    <a:masterClrMapping/>
+  </p:clrMapOvr>
+</p:notes>
+</file>
+
+<file path=ppt/notesSlides/notesSlide8.xml><?xml version="1.0" encoding="utf-8"?>
+<p:notes xmlns:a="http://schemas.openxmlformats.org/drawingml/2006/main" xmlns:r="http://schemas.openxmlformats.org/officeDocument/2006/relationships" xmlns:p="http://schemas.openxmlformats.org/presentationml/2006/main">
+  <p:cSld>
+    <p:spTree>
+      <p:nvGrpSpPr>
+        <p:cNvPr id="1" name=""/>
+        <p:cNvGrpSpPr/>
+        <p:nvPr/>
+      </p:nvGrpSpPr>
+      <p:grpSpPr>
+        <a:xfrm>
+          <a:off x="0" y="0"/>
+          <a:ext cx="0" cy="0"/>
+          <a:chOff x="0" y="0"/>
+          <a:chExt cx="0" cy="0"/>
+        </a:xfrm>
+      </p:grpSpPr>
+      <p:sp>
+        <p:nvSpPr>
+          <p:cNvPr id="2" name="Slide Image Placeholder 1"/>
+          <p:cNvSpPr>
+            <a:spLocks noGrp="1" noRot="1" noChangeAspect="1"/>
+          </p:cNvSpPr>
+          <p:nvPr>
+            <p:ph type="sldImg"/>
+          </p:nvPr>
+        </p:nvSpPr>
+        <p:spPr/>
+      </p:sp>
+      <p:sp>
+        <p:nvSpPr>
+          <p:cNvPr id="3" name="Notes Placeholder 2"/>
+          <p:cNvSpPr>
+            <a:spLocks noGrp="1"/>
+          </p:cNvSpPr>
+          <p:nvPr>
+            <p:ph type="body" idx="1"/>
+          </p:nvPr>
+        </p:nvSpPr>
+        <p:spPr/>
+        <p:txBody>
+          <a:bodyPr/>
+          <a:lstStyle/>
+          <a:p>
+            <a:endParaRPr lang="en-GB"/>
+          </a:p>
+        </p:txBody>
+      </p:sp>
+      <p:sp>
+        <p:nvSpPr>
+          <p:cNvPr id="4" name="Slide Number Placeholder 3"/>
+          <p:cNvSpPr>
+            <a:spLocks noGrp="1"/>
+          </p:cNvSpPr>
+          <p:nvPr>
+            <p:ph type="sldNum" sz="quarter" idx="10"/>
+          </p:nvPr>
+        </p:nvSpPr>
+        <p:spPr/>
+        <p:txBody>
+          <a:bodyPr/>
+          <a:lstStyle/>
+          <a:p>
+            <a:fld id="{C7CBB773-B53D-41B7-9A3B-E6071C122DB3}" type="slidenum">
+              <a:rPr lang="en-GB" smtClean="0"/>
+              <a:t>9</a:t>
+            </a:fld>
+            <a:endParaRPr lang="en-GB"/>
+          </a:p>
+        </p:txBody>
+      </p:sp>
+    </p:spTree>
+    <p:extLst>
+      <p:ext uri="{BB962C8B-B14F-4D97-AF65-F5344CB8AC3E}">
+        <p14:creationId xmlns:p14="http://schemas.microsoft.com/office/powerpoint/2010/main" val="2657087851"/>
+      </p:ext>
+    </p:extLst>
+  </p:cSld>
+  <p:clrMapOvr>
+    <a:masterClrMapping/>
+  </p:clrMapOvr>
+</p:notes>
+</file>
+
+<file path=ppt/notesSlides/notesSlide9.xml><?xml version="1.0" encoding="utf-8"?>
+<p:notes xmlns:a="http://schemas.openxmlformats.org/drawingml/2006/main" xmlns:r="http://schemas.openxmlformats.org/officeDocument/2006/relationships" xmlns:p="http://schemas.openxmlformats.org/presentationml/2006/main">
+  <p:cSld>
+    <p:spTree>
+      <p:nvGrpSpPr>
+        <p:cNvPr id="1" name=""/>
+        <p:cNvGrpSpPr/>
+        <p:nvPr/>
+      </p:nvGrpSpPr>
+      <p:grpSpPr>
+        <a:xfrm>
+          <a:off x="0" y="0"/>
+          <a:ext cx="0" cy="0"/>
+          <a:chOff x="0" y="0"/>
+          <a:chExt cx="0" cy="0"/>
+        </a:xfrm>
+      </p:grpSpPr>
+      <p:sp>
+        <p:nvSpPr>
+          <p:cNvPr id="2" name="Slide Image Placeholder 1"/>
+          <p:cNvSpPr>
+            <a:spLocks noGrp="1" noRot="1" noChangeAspect="1"/>
+          </p:cNvSpPr>
+          <p:nvPr>
+            <p:ph type="sldImg"/>
+          </p:nvPr>
+        </p:nvSpPr>
+        <p:spPr/>
+      </p:sp>
+      <p:sp>
+        <p:nvSpPr>
+          <p:cNvPr id="3" name="Notes Placeholder 2"/>
+          <p:cNvSpPr>
+            <a:spLocks noGrp="1"/>
+          </p:cNvSpPr>
+          <p:nvPr>
+            <p:ph type="body" idx="1"/>
+          </p:nvPr>
+        </p:nvSpPr>
+        <p:spPr/>
+        <p:txBody>
+          <a:bodyPr/>
+          <a:lstStyle/>
+          <a:p>
+            <a:endParaRPr lang="en-GB"/>
+          </a:p>
+        </p:txBody>
+      </p:sp>
+      <p:sp>
+        <p:nvSpPr>
+          <p:cNvPr id="4" name="Slide Number Placeholder 3"/>
+          <p:cNvSpPr>
+            <a:spLocks noGrp="1"/>
+          </p:cNvSpPr>
+          <p:nvPr>
+            <p:ph type="sldNum" sz="quarter" idx="10"/>
+          </p:nvPr>
+        </p:nvSpPr>
+        <p:spPr/>
+        <p:txBody>
+          <a:bodyPr/>
+          <a:lstStyle/>
+          <a:p>
+            <a:fld id="{C7CBB773-B53D-41B7-9A3B-E6071C122DB3}" type="slidenum">
+              <a:rPr lang="en-GB" smtClean="0"/>
+              <a:t>10</a:t>
+            </a:fld>
+            <a:endParaRPr lang="en-GB"/>
+          </a:p>
+        </p:txBody>
+      </p:sp>
+    </p:spTree>
+    <p:extLst>
+      <p:ext uri="{BB962C8B-B14F-4D97-AF65-F5344CB8AC3E}">
+        <p14:creationId xmlns:p14="http://schemas.microsoft.com/office/powerpoint/2010/main" val="349175199"/>
+      </p:ext>
+    </p:extLst>
+  </p:cSld>
+  <p:clrMapOvr>
+    <a:masterClrMapping/>
+  </p:clrMapOvr>
+</p:notes>
+</file>
+
 <file path=ppt/slideLayouts/slideLayout1.xml><?xml version="1.0" encoding="utf-8"?>
 <p:sldLayout xmlns:a="http://schemas.openxmlformats.org/drawingml/2006/main" xmlns:r="http://schemas.openxmlformats.org/officeDocument/2006/relationships" xmlns:p="http://schemas.openxmlformats.org/presentationml/2006/main" type="title" preserve="1">
   <p:cSld name="Tiêu đề Bản chiếu">
@@ -1124,7 +1379,7 @@
           <a:p>
             <a:fld id="{73EE8F9C-57C7-4DD6-8B35-7D3273B02C02}" type="datetimeFigureOut">
               <a:rPr lang="en-US" smtClean="0"/>
-              <a:t>5/14/2021</a:t>
+              <a:t>5/16/2021</a:t>
             </a:fld>
             <a:endParaRPr lang="en-US"/>
           </a:p>
@@ -1324,7 +1579,7 @@
           <a:p>
             <a:fld id="{73EE8F9C-57C7-4DD6-8B35-7D3273B02C02}" type="datetimeFigureOut">
               <a:rPr lang="en-US" smtClean="0"/>
-              <a:t>5/14/2021</a:t>
+              <a:t>5/16/2021</a:t>
             </a:fld>
             <a:endParaRPr lang="en-US"/>
           </a:p>
@@ -1534,7 +1789,7 @@
           <a:p>
             <a:fld id="{73EE8F9C-57C7-4DD6-8B35-7D3273B02C02}" type="datetimeFigureOut">
               <a:rPr lang="en-US" smtClean="0"/>
-              <a:t>5/14/2021</a:t>
+              <a:t>5/16/2021</a:t>
             </a:fld>
             <a:endParaRPr lang="en-US"/>
           </a:p>
@@ -1734,7 +1989,7 @@
           <a:p>
             <a:fld id="{73EE8F9C-57C7-4DD6-8B35-7D3273B02C02}" type="datetimeFigureOut">
               <a:rPr lang="en-US" smtClean="0"/>
-              <a:t>5/14/2021</a:t>
+              <a:t>5/16/2021</a:t>
             </a:fld>
             <a:endParaRPr lang="en-US"/>
           </a:p>
@@ -2010,7 +2265,7 @@
           <a:p>
             <a:fld id="{73EE8F9C-57C7-4DD6-8B35-7D3273B02C02}" type="datetimeFigureOut">
               <a:rPr lang="en-US" smtClean="0"/>
-              <a:t>5/14/2021</a:t>
+              <a:t>5/16/2021</a:t>
             </a:fld>
             <a:endParaRPr lang="en-US"/>
           </a:p>
@@ -2278,7 +2533,7 @@
           <a:p>
             <a:fld id="{73EE8F9C-57C7-4DD6-8B35-7D3273B02C02}" type="datetimeFigureOut">
               <a:rPr lang="en-US" smtClean="0"/>
-              <a:t>5/14/2021</a:t>
+              <a:t>5/16/2021</a:t>
             </a:fld>
             <a:endParaRPr lang="en-US"/>
           </a:p>
@@ -2693,7 +2948,7 @@
           <a:p>
             <a:fld id="{73EE8F9C-57C7-4DD6-8B35-7D3273B02C02}" type="datetimeFigureOut">
               <a:rPr lang="en-US" smtClean="0"/>
-              <a:t>5/14/2021</a:t>
+              <a:t>5/16/2021</a:t>
             </a:fld>
             <a:endParaRPr lang="en-US"/>
           </a:p>
@@ -2835,7 +3090,7 @@
           <a:p>
             <a:fld id="{73EE8F9C-57C7-4DD6-8B35-7D3273B02C02}" type="datetimeFigureOut">
               <a:rPr lang="en-US" smtClean="0"/>
-              <a:t>5/14/2021</a:t>
+              <a:t>5/16/2021</a:t>
             </a:fld>
             <a:endParaRPr lang="en-US"/>
           </a:p>
@@ -2948,7 +3203,7 @@
           <a:p>
             <a:fld id="{73EE8F9C-57C7-4DD6-8B35-7D3273B02C02}" type="datetimeFigureOut">
               <a:rPr lang="en-US" smtClean="0"/>
-              <a:t>5/14/2021</a:t>
+              <a:t>5/16/2021</a:t>
             </a:fld>
             <a:endParaRPr lang="en-US"/>
           </a:p>
@@ -3261,7 +3516,7 @@
           <a:p>
             <a:fld id="{73EE8F9C-57C7-4DD6-8B35-7D3273B02C02}" type="datetimeFigureOut">
               <a:rPr lang="en-US" smtClean="0"/>
-              <a:t>5/14/2021</a:t>
+              <a:t>5/16/2021</a:t>
             </a:fld>
             <a:endParaRPr lang="en-US"/>
           </a:p>
@@ -3550,7 +3805,7 @@
           <a:p>
             <a:fld id="{73EE8F9C-57C7-4DD6-8B35-7D3273B02C02}" type="datetimeFigureOut">
               <a:rPr lang="en-US" smtClean="0"/>
-              <a:t>5/14/2021</a:t>
+              <a:t>5/16/2021</a:t>
             </a:fld>
             <a:endParaRPr lang="en-US"/>
           </a:p>
@@ -3793,7 +4048,7 @@
           <a:p>
             <a:fld id="{73EE8F9C-57C7-4DD6-8B35-7D3273B02C02}" type="datetimeFigureOut">
               <a:rPr lang="en-US" smtClean="0"/>
-              <a:t>5/14/2021</a:t>
+              <a:t>5/16/2021</a:t>
             </a:fld>
             <a:endParaRPr lang="en-US"/>
           </a:p>
@@ -4273,6 +4528,986 @@
 </p:sld>
 </file>
 
+<file path=ppt/slides/slide10.xml><?xml version="1.0" encoding="utf-8"?>
+<p:sld xmlns:a="http://schemas.openxmlformats.org/drawingml/2006/main" xmlns:r="http://schemas.openxmlformats.org/officeDocument/2006/relationships" xmlns:p="http://schemas.openxmlformats.org/presentationml/2006/main">
+  <p:cSld>
+    <p:spTree>
+      <p:nvGrpSpPr>
+        <p:cNvPr id="1" name=""/>
+        <p:cNvGrpSpPr/>
+        <p:nvPr/>
+      </p:nvGrpSpPr>
+      <p:grpSpPr>
+        <a:xfrm>
+          <a:off x="0" y="0"/>
+          <a:ext cx="0" cy="0"/>
+          <a:chOff x="0" y="0"/>
+          <a:chExt cx="0" cy="0"/>
+        </a:xfrm>
+      </p:grpSpPr>
+      <p:sp>
+        <p:nvSpPr>
+          <p:cNvPr id="2" name="Title 1"/>
+          <p:cNvSpPr>
+            <a:spLocks noGrp="1"/>
+          </p:cNvSpPr>
+          <p:nvPr>
+            <p:ph type="title"/>
+          </p:nvPr>
+        </p:nvSpPr>
+        <p:spPr>
+          <a:xfrm>
+            <a:off x="1847528" y="116632"/>
+            <a:ext cx="8640960" cy="1143000"/>
+          </a:xfrm>
+        </p:spPr>
+        <p:txBody>
+          <a:bodyPr>
+            <a:noAutofit/>
+          </a:bodyPr>
+          <a:lstStyle/>
+          <a:p>
+            <a:pPr algn="ctr"/>
+            <a:r>
+              <a:rPr lang="en-US" sz="3600">
+                <a:latin typeface="Arial" panose="020B0604020202020204" pitchFamily="34" charset="0"/>
+                <a:cs typeface="Arial" panose="020B0604020202020204" pitchFamily="34" charset="0"/>
+              </a:rPr>
+              <a:t>Mô hình quy hoạch ràng buộc </a:t>
+            </a:r>
+            <a:br>
+              <a:rPr lang="en-US" sz="3600">
+                <a:latin typeface="Arial" panose="020B0604020202020204" pitchFamily="34" charset="0"/>
+                <a:cs typeface="Arial" panose="020B0604020202020204" pitchFamily="34" charset="0"/>
+              </a:rPr>
+            </a:br>
+            <a:r>
+              <a:rPr lang="en-US" sz="3600">
+                <a:latin typeface="Arial" panose="020B0604020202020204" pitchFamily="34" charset="0"/>
+                <a:cs typeface="Arial" panose="020B0604020202020204" pitchFamily="34" charset="0"/>
+              </a:rPr>
+              <a:t>(Constraint Programming - CP)</a:t>
+            </a:r>
+            <a:endParaRPr lang="en-GB" sz="3600" dirty="0">
+              <a:solidFill>
+                <a:schemeClr val="tx1"/>
+              </a:solidFill>
+              <a:latin typeface="Arial" panose="020B0604020202020204" pitchFamily="34" charset="0"/>
+              <a:cs typeface="Arial" panose="020B0604020202020204" pitchFamily="34" charset="0"/>
+            </a:endParaRPr>
+          </a:p>
+        </p:txBody>
+      </p:sp>
+      <mc:AlternateContent xmlns:mc="http://schemas.openxmlformats.org/markup-compatibility/2006">
+        <mc:Choice xmlns:a14="http://schemas.microsoft.com/office/drawing/2010/main" Requires="a14">
+          <p:sp>
+            <p:nvSpPr>
+              <p:cNvPr id="3" name="Content Placeholder 2"/>
+              <p:cNvSpPr>
+                <a:spLocks noGrp="1"/>
+              </p:cNvSpPr>
+              <p:nvPr>
+                <p:ph idx="1"/>
+              </p:nvPr>
+            </p:nvSpPr>
+            <p:spPr>
+              <a:xfrm>
+                <a:off x="1847528" y="1447800"/>
+                <a:ext cx="8568952" cy="5005536"/>
+              </a:xfrm>
+            </p:spPr>
+            <p:txBody>
+              <a:bodyPr>
+                <a:normAutofit/>
+              </a:bodyPr>
+              <a:lstStyle/>
+              <a:p>
+                <a:r>
+                  <a:rPr lang="en-US" dirty="0" smtClean="0">
+                    <a:latin typeface="Arial" panose="020B0604020202020204" pitchFamily="34" charset="0"/>
+                    <a:cs typeface="Arial" panose="020B0604020202020204" pitchFamily="34" charset="0"/>
+                  </a:rPr>
+                  <a:t>Ràng </a:t>
+                </a:r>
+                <a:r>
+                  <a:rPr lang="en-US" dirty="0" err="1">
+                    <a:latin typeface="Arial" panose="020B0604020202020204" pitchFamily="34" charset="0"/>
+                    <a:cs typeface="Arial" panose="020B0604020202020204" pitchFamily="34" charset="0"/>
+                  </a:rPr>
+                  <a:t>buộc</a:t>
+                </a:r>
+                <a:r>
+                  <a:rPr lang="en-US" dirty="0">
+                    <a:latin typeface="Arial" panose="020B0604020202020204" pitchFamily="34" charset="0"/>
+                    <a:cs typeface="Arial" panose="020B0604020202020204" pitchFamily="34" charset="0"/>
+                  </a:rPr>
+                  <a:t> (</a:t>
+                </a:r>
+                <a:r>
+                  <a:rPr lang="en-US" dirty="0" err="1">
+                    <a:latin typeface="Arial" panose="020B0604020202020204" pitchFamily="34" charset="0"/>
+                    <a:cs typeface="Arial" panose="020B0604020202020204" pitchFamily="34" charset="0"/>
+                  </a:rPr>
+                  <a:t>tiếp</a:t>
+                </a:r>
+                <a:r>
+                  <a:rPr lang="en-US" dirty="0">
+                    <a:latin typeface="Arial" panose="020B0604020202020204" pitchFamily="34" charset="0"/>
+                    <a:cs typeface="Arial" panose="020B0604020202020204" pitchFamily="34" charset="0"/>
+                  </a:rPr>
+                  <a:t>)</a:t>
+                </a:r>
+              </a:p>
+              <a:p>
+                <a:pPr marL="0" indent="0">
+                  <a:buNone/>
+                </a:pPr>
+                <a:r>
+                  <a:rPr lang="en-US" sz="2000" dirty="0">
+                    <a:latin typeface="Arial" panose="020B0604020202020204" pitchFamily="34" charset="0"/>
+                    <a:cs typeface="Arial" panose="020B0604020202020204" pitchFamily="34" charset="0"/>
+                  </a:rPr>
+                  <a:t>5</a:t>
+                </a:r>
+                <a:r>
+                  <a:rPr lang="en-US" sz="2000" dirty="0">
+                    <a:solidFill>
+                      <a:schemeClr val="tx1"/>
+                    </a:solidFill>
+                    <a:latin typeface="Arial" panose="020B0604020202020204" pitchFamily="34" charset="0"/>
+                    <a:cs typeface="Arial" panose="020B0604020202020204" pitchFamily="34" charset="0"/>
+                  </a:rPr>
+                  <a:t>. </a:t>
+                </a:r>
+                <a14:m>
+                  <m:oMath xmlns:m="http://schemas.openxmlformats.org/officeDocument/2006/math">
+                    <m:r>
+                      <m:rPr>
+                        <m:sty m:val="p"/>
+                      </m:rPr>
+                      <a:rPr lang="en-US" sz="2000" b="0" i="0" dirty="0" smtClean="0">
+                        <a:latin typeface="Cambria Math" panose="02040503050406030204" pitchFamily="18" charset="0"/>
+                        <a:cs typeface="Arial" panose="020B0604020202020204" pitchFamily="34" charset="0"/>
+                      </a:rPr>
+                      <m:t>X</m:t>
+                    </m:r>
+                    <m:r>
+                      <a:rPr lang="en-US" sz="2000" b="0" i="0" dirty="0" smtClean="0">
+                        <a:latin typeface="Cambria Math" panose="02040503050406030204" pitchFamily="18" charset="0"/>
+                        <a:cs typeface="Arial" panose="020B0604020202020204" pitchFamily="34" charset="0"/>
+                      </a:rPr>
+                      <m:t>[</m:t>
+                    </m:r>
+                    <m:r>
+                      <m:rPr>
+                        <m:sty m:val="p"/>
+                      </m:rPr>
+                      <a:rPr lang="en-US" sz="2000" b="0" i="0" dirty="0" err="1">
+                        <a:latin typeface="Cambria Math" panose="02040503050406030204" pitchFamily="18" charset="0"/>
+                        <a:cs typeface="Arial" panose="020B0604020202020204" pitchFamily="34" charset="0"/>
+                      </a:rPr>
+                      <m:t>i</m:t>
+                    </m:r>
+                    <m:r>
+                      <a:rPr lang="en-US" sz="2000" b="0" i="0" dirty="0" smtClean="0">
+                        <a:latin typeface="Cambria Math" panose="02040503050406030204" pitchFamily="18" charset="0"/>
+                        <a:cs typeface="Arial" panose="020B0604020202020204" pitchFamily="34" charset="0"/>
+                      </a:rPr>
+                      <m:t>]</m:t>
+                    </m:r>
+                    <m:r>
+                      <a:rPr lang="en-US" sz="2000" b="0" i="0" dirty="0">
+                        <a:latin typeface="Cambria Math" panose="02040503050406030204" pitchFamily="18" charset="0"/>
+                        <a:cs typeface="Arial" panose="020B0604020202020204" pitchFamily="34" charset="0"/>
+                      </a:rPr>
+                      <m:t> =</m:t>
+                    </m:r>
+                    <m:r>
+                      <m:rPr>
+                        <m:sty m:val="p"/>
+                      </m:rPr>
+                      <a:rPr lang="en-US" sz="2000" b="0" i="0" dirty="0" smtClean="0">
+                        <a:latin typeface="Cambria Math" panose="02040503050406030204" pitchFamily="18" charset="0"/>
+                        <a:cs typeface="Arial" panose="020B0604020202020204" pitchFamily="34" charset="0"/>
+                      </a:rPr>
+                      <m:t>j</m:t>
+                    </m:r>
+                    <m:r>
+                      <a:rPr lang="en-US" sz="2000" b="0" i="0" dirty="0">
+                        <a:latin typeface="Cambria Math" panose="02040503050406030204" pitchFamily="18" charset="0"/>
+                        <a:cs typeface="Arial" panose="020B0604020202020204" pitchFamily="34" charset="0"/>
+                      </a:rPr>
+                      <m:t> </m:t>
+                    </m:r>
+                    <m:r>
+                      <a:rPr lang="en-US" sz="2000" b="0" i="0" dirty="0">
+                        <a:latin typeface="Cambria Math" panose="02040503050406030204" pitchFamily="18" charset="0"/>
+                        <a:cs typeface="Arial" panose="020B0604020202020204" pitchFamily="34" charset="0"/>
+                        <a:sym typeface="Wingdings" panose="05000000000000000000" pitchFamily="2" charset="2"/>
+                      </a:rPr>
+                      <m:t> </m:t>
+                    </m:r>
+                    <m:r>
+                      <m:rPr>
+                        <m:sty m:val="p"/>
+                      </m:rPr>
+                      <a:rPr lang="en-US" sz="2000" b="0" i="0" dirty="0">
+                        <a:latin typeface="Cambria Math" panose="02040503050406030204" pitchFamily="18" charset="0"/>
+                        <a:cs typeface="Arial" panose="020B0604020202020204" pitchFamily="34" charset="0"/>
+                        <a:sym typeface="Wingdings" panose="05000000000000000000" pitchFamily="2" charset="2"/>
+                      </a:rPr>
+                      <m:t>Z</m:t>
+                    </m:r>
+                    <m:r>
+                      <a:rPr lang="en-US" sz="2000" b="0" i="0" dirty="0">
+                        <a:latin typeface="Cambria Math" panose="02040503050406030204" pitchFamily="18" charset="0"/>
+                        <a:cs typeface="Arial" panose="020B0604020202020204" pitchFamily="34" charset="0"/>
+                        <a:sym typeface="Wingdings" panose="05000000000000000000" pitchFamily="2" charset="2"/>
+                      </a:rPr>
+                      <m:t>[</m:t>
+                    </m:r>
+                    <m:r>
+                      <m:rPr>
+                        <m:sty m:val="p"/>
+                      </m:rPr>
+                      <a:rPr lang="en-US" sz="2000" b="0" i="0" dirty="0">
+                        <a:latin typeface="Cambria Math" panose="02040503050406030204" pitchFamily="18" charset="0"/>
+                        <a:cs typeface="Arial" panose="020B0604020202020204" pitchFamily="34" charset="0"/>
+                        <a:sym typeface="Wingdings" panose="05000000000000000000" pitchFamily="2" charset="2"/>
+                      </a:rPr>
+                      <m:t>j</m:t>
+                    </m:r>
+                    <m:r>
+                      <a:rPr lang="en-US" sz="2000" b="0" i="0" dirty="0">
+                        <a:latin typeface="Cambria Math" panose="02040503050406030204" pitchFamily="18" charset="0"/>
+                        <a:cs typeface="Arial" panose="020B0604020202020204" pitchFamily="34" charset="0"/>
+                        <a:sym typeface="Wingdings" panose="05000000000000000000" pitchFamily="2" charset="2"/>
+                      </a:rPr>
+                      <m:t>] = </m:t>
+                    </m:r>
+                    <m:r>
+                      <m:rPr>
+                        <m:sty m:val="p"/>
+                      </m:rPr>
+                      <a:rPr lang="en-US" sz="2000" b="0" i="0" dirty="0">
+                        <a:latin typeface="Cambria Math" panose="02040503050406030204" pitchFamily="18" charset="0"/>
+                        <a:cs typeface="Arial" panose="020B0604020202020204" pitchFamily="34" charset="0"/>
+                        <a:sym typeface="Wingdings" panose="05000000000000000000" pitchFamily="2" charset="2"/>
+                      </a:rPr>
+                      <m:t>Z</m:t>
+                    </m:r>
+                    <m:r>
+                      <a:rPr lang="en-US" sz="2000" b="0" i="0" dirty="0">
+                        <a:latin typeface="Cambria Math" panose="02040503050406030204" pitchFamily="18" charset="0"/>
+                        <a:cs typeface="Arial" panose="020B0604020202020204" pitchFamily="34" charset="0"/>
+                        <a:sym typeface="Wingdings" panose="05000000000000000000" pitchFamily="2" charset="2"/>
+                      </a:rPr>
+                      <m:t>[</m:t>
+                    </m:r>
+                    <m:r>
+                      <m:rPr>
+                        <m:sty m:val="p"/>
+                      </m:rPr>
+                      <a:rPr lang="en-US" sz="2000" b="0" i="0" dirty="0" err="1">
+                        <a:latin typeface="Cambria Math" panose="02040503050406030204" pitchFamily="18" charset="0"/>
+                        <a:cs typeface="Arial" panose="020B0604020202020204" pitchFamily="34" charset="0"/>
+                        <a:sym typeface="Wingdings" panose="05000000000000000000" pitchFamily="2" charset="2"/>
+                      </a:rPr>
+                      <m:t>i</m:t>
+                    </m:r>
+                    <m:r>
+                      <a:rPr lang="en-US" sz="2000" b="0" i="0" dirty="0">
+                        <a:latin typeface="Cambria Math" panose="02040503050406030204" pitchFamily="18" charset="0"/>
+                        <a:cs typeface="Arial" panose="020B0604020202020204" pitchFamily="34" charset="0"/>
+                        <a:sym typeface="Wingdings" panose="05000000000000000000" pitchFamily="2" charset="2"/>
+                      </a:rPr>
+                      <m:t>] + </m:t>
+                    </m:r>
+                    <m:r>
+                      <m:rPr>
+                        <m:sty m:val="p"/>
+                      </m:rPr>
+                      <a:rPr lang="en-US" sz="2000" b="0" i="0" dirty="0">
+                        <a:latin typeface="Cambria Math" panose="02040503050406030204" pitchFamily="18" charset="0"/>
+                        <a:cs typeface="Arial" panose="020B0604020202020204" pitchFamily="34" charset="0"/>
+                        <a:sym typeface="Wingdings" panose="05000000000000000000" pitchFamily="2" charset="2"/>
+                      </a:rPr>
+                      <m:t>d</m:t>
+                    </m:r>
+                    <m:r>
+                      <a:rPr lang="en-US" sz="2000" b="0" i="0" dirty="0">
+                        <a:latin typeface="Cambria Math" panose="02040503050406030204" pitchFamily="18" charset="0"/>
+                        <a:cs typeface="Arial" panose="020B0604020202020204" pitchFamily="34" charset="0"/>
+                        <a:sym typeface="Wingdings" panose="05000000000000000000" pitchFamily="2" charset="2"/>
+                      </a:rPr>
+                      <m:t>[</m:t>
+                    </m:r>
+                    <m:r>
+                      <m:rPr>
+                        <m:sty m:val="p"/>
+                      </m:rPr>
+                      <a:rPr lang="en-US" sz="2000" b="0" i="0" dirty="0" err="1">
+                        <a:latin typeface="Cambria Math" panose="02040503050406030204" pitchFamily="18" charset="0"/>
+                        <a:cs typeface="Arial" panose="020B0604020202020204" pitchFamily="34" charset="0"/>
+                        <a:sym typeface="Wingdings" panose="05000000000000000000" pitchFamily="2" charset="2"/>
+                      </a:rPr>
+                      <m:t>i</m:t>
+                    </m:r>
+                    <m:r>
+                      <a:rPr lang="en-US" sz="2000" b="0" i="0" dirty="0">
+                        <a:latin typeface="Cambria Math" panose="02040503050406030204" pitchFamily="18" charset="0"/>
+                        <a:cs typeface="Arial" panose="020B0604020202020204" pitchFamily="34" charset="0"/>
+                        <a:sym typeface="Wingdings" panose="05000000000000000000" pitchFamily="2" charset="2"/>
+                      </a:rPr>
+                      <m:t>][</m:t>
+                    </m:r>
+                    <m:r>
+                      <m:rPr>
+                        <m:sty m:val="p"/>
+                      </m:rPr>
+                      <a:rPr lang="en-US" sz="2000" b="0" i="0" dirty="0">
+                        <a:latin typeface="Cambria Math" panose="02040503050406030204" pitchFamily="18" charset="0"/>
+                        <a:cs typeface="Arial" panose="020B0604020202020204" pitchFamily="34" charset="0"/>
+                        <a:sym typeface="Wingdings" panose="05000000000000000000" pitchFamily="2" charset="2"/>
+                      </a:rPr>
+                      <m:t>j</m:t>
+                    </m:r>
+                    <m:r>
+                      <a:rPr lang="en-US" sz="2000" b="0" i="0" dirty="0">
+                        <a:latin typeface="Cambria Math" panose="02040503050406030204" pitchFamily="18" charset="0"/>
+                        <a:cs typeface="Arial" panose="020B0604020202020204" pitchFamily="34" charset="0"/>
+                        <a:sym typeface="Wingdings" panose="05000000000000000000" pitchFamily="2" charset="2"/>
+                      </a:rPr>
+                      <m:t>] </m:t>
+                    </m:r>
+                  </m:oMath>
+                </a14:m>
+                <a:r>
+                  <a:rPr lang="en-US" sz="2000" dirty="0" err="1">
+                    <a:latin typeface="Arial" panose="020B0604020202020204" pitchFamily="34" charset="0"/>
+                    <a:cs typeface="Arial" panose="020B0604020202020204" pitchFamily="34" charset="0"/>
+                    <a:sym typeface="Wingdings" panose="05000000000000000000" pitchFamily="2" charset="2"/>
+                  </a:rPr>
+                  <a:t>với</a:t>
+                </a:r>
+                <a:r>
+                  <a:rPr lang="en-US" sz="2000" dirty="0">
+                    <a:latin typeface="Arial" panose="020B0604020202020204" pitchFamily="34" charset="0"/>
+                    <a:cs typeface="Arial" panose="020B0604020202020204" pitchFamily="34" charset="0"/>
+                    <a:sym typeface="Wingdings" panose="05000000000000000000" pitchFamily="2" charset="2"/>
+                  </a:rPr>
+                  <a:t> </a:t>
+                </a:r>
+                <a:r>
+                  <a:rPr lang="en-GB" sz="2000" dirty="0">
+                    <a:latin typeface="Arial" panose="020B0604020202020204" pitchFamily="34" charset="0"/>
+                    <a:cs typeface="Arial" panose="020B0604020202020204" pitchFamily="34" charset="0"/>
+                    <a:sym typeface="Symbol" panose="05050102010706020507" pitchFamily="18" charset="2"/>
+                  </a:rPr>
+                  <a:t></a:t>
+                </a:r>
+                <a:r>
+                  <a:rPr lang="en-US" sz="2000" dirty="0">
+                    <a:latin typeface="Arial" panose="020B0604020202020204" pitchFamily="34" charset="0"/>
+                    <a:cs typeface="Arial" panose="020B0604020202020204" pitchFamily="34" charset="0"/>
+                    <a:sym typeface="Wingdings" panose="05000000000000000000" pitchFamily="2" charset="2"/>
+                  </a:rPr>
+                  <a:t> </a:t>
+                </a:r>
+                <a:r>
+                  <a:rPr lang="en-US" sz="2000" dirty="0" err="1">
+                    <a:latin typeface="Arial" panose="020B0604020202020204" pitchFamily="34" charset="0"/>
+                    <a:cs typeface="Arial" panose="020B0604020202020204" pitchFamily="34" charset="0"/>
+                    <a:sym typeface="Wingdings" panose="05000000000000000000" pitchFamily="2" charset="2"/>
+                  </a:rPr>
+                  <a:t>i,j</a:t>
+                </a:r>
+                <a:r>
+                  <a:rPr lang="en-US" sz="2000" dirty="0">
+                    <a:latin typeface="Arial" panose="020B0604020202020204" pitchFamily="34" charset="0"/>
+                    <a:cs typeface="Arial" panose="020B0604020202020204" pitchFamily="34" charset="0"/>
+                    <a:sym typeface="Wingdings" panose="05000000000000000000" pitchFamily="2" charset="2"/>
+                  </a:rPr>
+                  <a:t> = 0…M+1, </a:t>
+                </a:r>
+                <a:r>
+                  <a:rPr lang="en-US" sz="2000" dirty="0" err="1">
+                    <a:latin typeface="Arial" panose="020B0604020202020204" pitchFamily="34" charset="0"/>
+                    <a:cs typeface="Arial" panose="020B0604020202020204" pitchFamily="34" charset="0"/>
+                    <a:sym typeface="Wingdings" panose="05000000000000000000" pitchFamily="2" charset="2"/>
+                  </a:rPr>
+                  <a:t>i</a:t>
+                </a:r>
+                <a:r>
+                  <a:rPr lang="en-US" sz="2000" dirty="0">
+                    <a:latin typeface="Arial" panose="020B0604020202020204" pitchFamily="34" charset="0"/>
+                    <a:cs typeface="Arial" panose="020B0604020202020204" pitchFamily="34" charset="0"/>
+                    <a:sym typeface="Wingdings" panose="05000000000000000000" pitchFamily="2" charset="2"/>
+                  </a:rPr>
+                  <a:t> ≠ j</a:t>
+                </a:r>
+              </a:p>
+              <a:p>
+                <a:pPr marL="0" indent="0">
+                  <a:buNone/>
+                </a:pPr>
+                <a:endParaRPr lang="en-US" sz="2000" dirty="0">
+                  <a:solidFill>
+                    <a:schemeClr val="tx1"/>
+                  </a:solidFill>
+                  <a:latin typeface="Arial" panose="020B0604020202020204" pitchFamily="34" charset="0"/>
+                  <a:cs typeface="Arial" panose="020B0604020202020204" pitchFamily="34" charset="0"/>
+                </a:endParaRPr>
+              </a:p>
+              <a:p>
+                <a:pPr marL="0" indent="0">
+                  <a:buNone/>
+                </a:pPr>
+                <a:r>
+                  <a:rPr lang="en-US" sz="2000" dirty="0">
+                    <a:latin typeface="Arial" panose="020B0604020202020204" pitchFamily="34" charset="0"/>
+                    <a:cs typeface="Arial" panose="020B0604020202020204" pitchFamily="34" charset="0"/>
+                  </a:rPr>
+                  <a:t>6</a:t>
+                </a:r>
+                <a:r>
+                  <a:rPr lang="en-US" sz="2000" dirty="0">
+                    <a:solidFill>
+                      <a:schemeClr val="tx1"/>
+                    </a:solidFill>
+                    <a:latin typeface="Arial" panose="020B0604020202020204" pitchFamily="34" charset="0"/>
+                    <a:cs typeface="Arial" panose="020B0604020202020204" pitchFamily="34" charset="0"/>
+                  </a:rPr>
+                  <a:t>. </a:t>
+                </a:r>
+                <a14:m>
+                  <m:oMath xmlns:m="http://schemas.openxmlformats.org/officeDocument/2006/math">
+                    <m:nary>
+                      <m:naryPr>
+                        <m:chr m:val="∑"/>
+                        <m:limLoc m:val="undOvr"/>
+                        <m:grow m:val="on"/>
+                        <m:ctrlPr>
+                          <a:rPr lang="en-US" sz="2000" i="1" smtClean="0">
+                            <a:latin typeface="Cambria Math" panose="02040503050406030204" pitchFamily="18" charset="0"/>
+                            <a:sym typeface="Wingdings" panose="05000000000000000000" pitchFamily="2" charset="2"/>
+                          </a:rPr>
+                        </m:ctrlPr>
+                      </m:naryPr>
+                      <m:sub>
+                        <m:r>
+                          <a:rPr lang="en-US" sz="2000" i="1">
+                            <a:latin typeface="Cambria Math" panose="02040503050406030204" pitchFamily="18" charset="0"/>
+                            <a:sym typeface="Wingdings" panose="05000000000000000000" pitchFamily="2" charset="2"/>
+                          </a:rPr>
+                          <m:t>𝑗</m:t>
+                        </m:r>
+                        <m:r>
+                          <a:rPr lang="en-US" sz="2000" i="1">
+                            <a:latin typeface="Cambria Math" panose="02040503050406030204" pitchFamily="18" charset="0"/>
+                            <a:sym typeface="Wingdings" panose="05000000000000000000" pitchFamily="2" charset="2"/>
+                          </a:rPr>
+                          <m:t>=1</m:t>
+                        </m:r>
+                      </m:sub>
+                      <m:sup>
+                        <m:r>
+                          <a:rPr lang="en-US" sz="2000" i="1">
+                            <a:latin typeface="Cambria Math" panose="02040503050406030204" pitchFamily="18" charset="0"/>
+                            <a:sym typeface="Wingdings" panose="05000000000000000000" pitchFamily="2" charset="2"/>
+                          </a:rPr>
+                          <m:t>𝑀</m:t>
+                        </m:r>
+                      </m:sup>
+                      <m:e>
+                        <m:r>
+                          <a:rPr lang="en-US" sz="2000" b="0" i="1" smtClean="0">
+                            <a:latin typeface="Cambria Math" panose="02040503050406030204" pitchFamily="18" charset="0"/>
+                            <a:sym typeface="Wingdings" panose="05000000000000000000" pitchFamily="2" charset="2"/>
+                          </a:rPr>
+                          <m:t>𝑄</m:t>
+                        </m:r>
+                        <m:d>
+                          <m:dPr>
+                            <m:begChr m:val="["/>
+                            <m:endChr m:val="]"/>
+                            <m:ctrlPr>
+                              <a:rPr lang="en-US" sz="2000" b="0" i="1" smtClean="0">
+                                <a:latin typeface="Cambria Math" panose="02040503050406030204" pitchFamily="18" charset="0"/>
+                                <a:sym typeface="Wingdings" panose="05000000000000000000" pitchFamily="2" charset="2"/>
+                              </a:rPr>
+                            </m:ctrlPr>
+                          </m:dPr>
+                          <m:e>
+                            <m:r>
+                              <a:rPr lang="en-US" sz="2000" b="0" i="1" smtClean="0">
+                                <a:latin typeface="Cambria Math" panose="02040503050406030204" pitchFamily="18" charset="0"/>
+                                <a:sym typeface="Wingdings" panose="05000000000000000000" pitchFamily="2" charset="2"/>
+                              </a:rPr>
+                              <m:t>𝑖</m:t>
+                            </m:r>
+                          </m:e>
+                        </m:d>
+                        <m:d>
+                          <m:dPr>
+                            <m:begChr m:val="["/>
+                            <m:endChr m:val="]"/>
+                            <m:ctrlPr>
+                              <a:rPr lang="en-US" sz="2000" b="0" i="1" smtClean="0">
+                                <a:latin typeface="Cambria Math" panose="02040503050406030204" pitchFamily="18" charset="0"/>
+                                <a:sym typeface="Wingdings" panose="05000000000000000000" pitchFamily="2" charset="2"/>
+                              </a:rPr>
+                            </m:ctrlPr>
+                          </m:dPr>
+                          <m:e>
+                            <m:r>
+                              <a:rPr lang="en-US" sz="2000" b="0" i="1" smtClean="0">
+                                <a:latin typeface="Cambria Math" panose="02040503050406030204" pitchFamily="18" charset="0"/>
+                                <a:sym typeface="Wingdings" panose="05000000000000000000" pitchFamily="2" charset="2"/>
+                              </a:rPr>
+                              <m:t>𝑗</m:t>
+                            </m:r>
+                          </m:e>
+                        </m:d>
+                        <m:r>
+                          <a:rPr lang="en-US" sz="2000" b="0" i="1" smtClean="0">
+                            <a:latin typeface="Cambria Math" panose="02040503050406030204" pitchFamily="18" charset="0"/>
+                            <a:sym typeface="Wingdings" panose="05000000000000000000" pitchFamily="2" charset="2"/>
+                          </a:rPr>
+                          <m:t>.</m:t>
+                        </m:r>
+                        <m:r>
+                          <a:rPr lang="en-US" sz="2000" b="0" i="1" smtClean="0">
+                            <a:latin typeface="Cambria Math" panose="02040503050406030204" pitchFamily="18" charset="0"/>
+                            <a:sym typeface="Wingdings" panose="05000000000000000000" pitchFamily="2" charset="2"/>
+                          </a:rPr>
+                          <m:t>𝑌</m:t>
+                        </m:r>
+                        <m:d>
+                          <m:dPr>
+                            <m:begChr m:val="["/>
+                            <m:endChr m:val="]"/>
+                            <m:ctrlPr>
+                              <a:rPr lang="en-US" sz="2000" b="0" i="1" smtClean="0">
+                                <a:latin typeface="Cambria Math" panose="02040503050406030204" pitchFamily="18" charset="0"/>
+                                <a:sym typeface="Wingdings" panose="05000000000000000000" pitchFamily="2" charset="2"/>
+                              </a:rPr>
+                            </m:ctrlPr>
+                          </m:dPr>
+                          <m:e>
+                            <m:r>
+                              <a:rPr lang="en-US" sz="2000" b="0" i="1" smtClean="0">
+                                <a:latin typeface="Cambria Math" panose="02040503050406030204" pitchFamily="18" charset="0"/>
+                                <a:sym typeface="Wingdings" panose="05000000000000000000" pitchFamily="2" charset="2"/>
+                              </a:rPr>
+                              <m:t>𝑗</m:t>
+                            </m:r>
+                          </m:e>
+                        </m:d>
+                        <m:r>
+                          <a:rPr lang="en-US" sz="2000" i="1" dirty="0">
+                            <a:latin typeface="Cambria Math" panose="02040503050406030204" pitchFamily="18" charset="0"/>
+                          </a:rPr>
+                          <m:t>≥</m:t>
+                        </m:r>
+                        <m:r>
+                          <a:rPr lang="en-US" sz="2000" b="0" i="1" dirty="0" smtClean="0">
+                            <a:latin typeface="Cambria Math" panose="02040503050406030204" pitchFamily="18" charset="0"/>
+                          </a:rPr>
+                          <m:t>𝑞</m:t>
+                        </m:r>
+                        <m:r>
+                          <a:rPr lang="en-US" sz="2000" b="0" i="1" dirty="0" smtClean="0">
+                            <a:latin typeface="Cambria Math" panose="02040503050406030204" pitchFamily="18" charset="0"/>
+                          </a:rPr>
+                          <m:t>[</m:t>
+                        </m:r>
+                        <m:r>
+                          <a:rPr lang="en-US" sz="2000" b="0" i="1" dirty="0" smtClean="0">
+                            <a:latin typeface="Cambria Math" panose="02040503050406030204" pitchFamily="18" charset="0"/>
+                          </a:rPr>
+                          <m:t>𝑖</m:t>
+                        </m:r>
+                        <m:r>
+                          <a:rPr lang="en-US" sz="2000" b="0" i="1" dirty="0" smtClean="0">
+                            <a:latin typeface="Cambria Math" panose="02040503050406030204" pitchFamily="18" charset="0"/>
+                          </a:rPr>
+                          <m:t>]</m:t>
+                        </m:r>
+                      </m:e>
+                    </m:nary>
+                  </m:oMath>
+                </a14:m>
+                <a:r>
+                  <a:rPr lang="en-US" sz="2000" dirty="0">
+                    <a:latin typeface="Arial" panose="020B0604020202020204" pitchFamily="34" charset="0"/>
+                    <a:cs typeface="Arial" panose="020B0604020202020204" pitchFamily="34" charset="0"/>
+                    <a:sym typeface="Wingdings" panose="05000000000000000000" pitchFamily="2" charset="2"/>
+                  </a:rPr>
+                  <a:t>, </a:t>
+                </a:r>
+                <a:r>
+                  <a:rPr lang="en-US" sz="2000" dirty="0" err="1">
+                    <a:latin typeface="Arial" panose="020B0604020202020204" pitchFamily="34" charset="0"/>
+                    <a:cs typeface="Arial" panose="020B0604020202020204" pitchFamily="34" charset="0"/>
+                    <a:sym typeface="Wingdings" panose="05000000000000000000" pitchFamily="2" charset="2"/>
+                  </a:rPr>
+                  <a:t>với</a:t>
+                </a:r>
+                <a:r>
+                  <a:rPr lang="en-US" sz="2000" dirty="0">
+                    <a:latin typeface="Arial" panose="020B0604020202020204" pitchFamily="34" charset="0"/>
+                    <a:cs typeface="Arial" panose="020B0604020202020204" pitchFamily="34" charset="0"/>
+                    <a:sym typeface="Wingdings" panose="05000000000000000000" pitchFamily="2" charset="2"/>
+                  </a:rPr>
+                  <a:t> </a:t>
+                </a:r>
+                <a:r>
+                  <a:rPr lang="en-GB" sz="2000" dirty="0">
+                    <a:latin typeface="Arial" panose="020B0604020202020204" pitchFamily="34" charset="0"/>
+                    <a:cs typeface="Arial" panose="020B0604020202020204" pitchFamily="34" charset="0"/>
+                    <a:sym typeface="Symbol" panose="05050102010706020507" pitchFamily="18" charset="2"/>
+                  </a:rPr>
+                  <a:t> </a:t>
+                </a:r>
+                <a:r>
+                  <a:rPr lang="en-GB" sz="2000" dirty="0" err="1">
+                    <a:latin typeface="Arial" panose="020B0604020202020204" pitchFamily="34" charset="0"/>
+                    <a:cs typeface="Arial" panose="020B0604020202020204" pitchFamily="34" charset="0"/>
+                    <a:sym typeface="Symbol" panose="05050102010706020507" pitchFamily="18" charset="2"/>
+                  </a:rPr>
+                  <a:t>i</a:t>
+                </a:r>
+                <a:r>
+                  <a:rPr lang="en-GB" sz="2000" dirty="0">
+                    <a:latin typeface="Arial" panose="020B0604020202020204" pitchFamily="34" charset="0"/>
+                    <a:cs typeface="Arial" panose="020B0604020202020204" pitchFamily="34" charset="0"/>
+                    <a:sym typeface="Symbol" panose="05050102010706020507" pitchFamily="18" charset="2"/>
+                  </a:rPr>
+                  <a:t>=1…N</a:t>
+                </a:r>
+                <a:endParaRPr lang="en-US" sz="2000" dirty="0">
+                  <a:latin typeface="Arial" panose="020B0604020202020204" pitchFamily="34" charset="0"/>
+                  <a:cs typeface="Arial" panose="020B0604020202020204" pitchFamily="34" charset="0"/>
+                  <a:sym typeface="Wingdings" panose="05000000000000000000" pitchFamily="2" charset="2"/>
+                </a:endParaRPr>
+              </a:p>
+              <a:p>
+                <a:endParaRPr lang="en-US" dirty="0">
+                  <a:latin typeface="Arial" panose="020B0604020202020204" pitchFamily="34" charset="0"/>
+                  <a:cs typeface="Arial" panose="020B0604020202020204" pitchFamily="34" charset="0"/>
+                  <a:sym typeface="Wingdings" panose="05000000000000000000" pitchFamily="2" charset="2"/>
+                </a:endParaRPr>
+              </a:p>
+              <a:p>
+                <a:r>
+                  <a:rPr lang="en-US" dirty="0" err="1">
+                    <a:latin typeface="Arial" panose="020B0604020202020204" pitchFamily="34" charset="0"/>
+                    <a:cs typeface="Arial" panose="020B0604020202020204" pitchFamily="34" charset="0"/>
+                    <a:sym typeface="Wingdings" panose="05000000000000000000" pitchFamily="2" charset="2"/>
+                  </a:rPr>
+                  <a:t>Hàm</a:t>
+                </a:r>
+                <a:r>
+                  <a:rPr lang="en-US" dirty="0">
+                    <a:latin typeface="Arial" panose="020B0604020202020204" pitchFamily="34" charset="0"/>
+                    <a:cs typeface="Arial" panose="020B0604020202020204" pitchFamily="34" charset="0"/>
+                    <a:sym typeface="Wingdings" panose="05000000000000000000" pitchFamily="2" charset="2"/>
+                  </a:rPr>
+                  <a:t> </a:t>
+                </a:r>
+                <a:r>
+                  <a:rPr lang="en-US" dirty="0" err="1">
+                    <a:latin typeface="Arial" panose="020B0604020202020204" pitchFamily="34" charset="0"/>
+                    <a:cs typeface="Arial" panose="020B0604020202020204" pitchFamily="34" charset="0"/>
+                    <a:sym typeface="Wingdings" panose="05000000000000000000" pitchFamily="2" charset="2"/>
+                  </a:rPr>
+                  <a:t>mục</a:t>
+                </a:r>
+                <a:r>
+                  <a:rPr lang="en-US" dirty="0">
+                    <a:latin typeface="Arial" panose="020B0604020202020204" pitchFamily="34" charset="0"/>
+                    <a:cs typeface="Arial" panose="020B0604020202020204" pitchFamily="34" charset="0"/>
+                    <a:sym typeface="Wingdings" panose="05000000000000000000" pitchFamily="2" charset="2"/>
+                  </a:rPr>
+                  <a:t> </a:t>
+                </a:r>
+                <a:r>
+                  <a:rPr lang="en-US" dirty="0" err="1">
+                    <a:latin typeface="Arial" panose="020B0604020202020204" pitchFamily="34" charset="0"/>
+                    <a:cs typeface="Arial" panose="020B0604020202020204" pitchFamily="34" charset="0"/>
+                    <a:sym typeface="Wingdings" panose="05000000000000000000" pitchFamily="2" charset="2"/>
+                  </a:rPr>
+                  <a:t>tiêu</a:t>
+                </a:r>
+                <a:endParaRPr lang="en-US" dirty="0">
+                  <a:latin typeface="Arial" panose="020B0604020202020204" pitchFamily="34" charset="0"/>
+                  <a:cs typeface="Arial" panose="020B0604020202020204" pitchFamily="34" charset="0"/>
+                  <a:sym typeface="Wingdings" panose="05000000000000000000" pitchFamily="2" charset="2"/>
+                </a:endParaRPr>
+              </a:p>
+              <a:p>
+                <a:pPr lvl="1"/>
+                <a14:m>
+                  <m:oMath xmlns:m="http://schemas.openxmlformats.org/officeDocument/2006/math">
+                    <m:r>
+                      <a:rPr lang="en-US" i="1" dirty="0" smtClean="0">
+                        <a:latin typeface="Cambria Math" panose="02040503050406030204" pitchFamily="18" charset="0"/>
+                        <a:cs typeface="Arial" panose="020B0604020202020204" pitchFamily="34" charset="0"/>
+                        <a:sym typeface="Wingdings" panose="05000000000000000000" pitchFamily="2" charset="2"/>
+                      </a:rPr>
+                      <m:t>𝑓</m:t>
+                    </m:r>
+                    <m:d>
+                      <m:dPr>
+                        <m:ctrlPr>
+                          <a:rPr lang="en-US" i="1" dirty="0" smtClean="0">
+                            <a:latin typeface="Cambria Math" panose="02040503050406030204" pitchFamily="18" charset="0"/>
+                            <a:cs typeface="Arial" panose="020B0604020202020204" pitchFamily="34" charset="0"/>
+                            <a:sym typeface="Wingdings" panose="05000000000000000000" pitchFamily="2" charset="2"/>
+                          </a:rPr>
+                        </m:ctrlPr>
+                      </m:dPr>
+                      <m:e>
+                        <m:r>
+                          <a:rPr lang="en-US" i="1" dirty="0" smtClean="0">
+                            <a:latin typeface="Cambria Math" panose="02040503050406030204" pitchFamily="18" charset="0"/>
+                            <a:cs typeface="Arial" panose="020B0604020202020204" pitchFamily="34" charset="0"/>
+                            <a:sym typeface="Wingdings" panose="05000000000000000000" pitchFamily="2" charset="2"/>
+                          </a:rPr>
+                          <m:t>𝑋</m:t>
+                        </m:r>
+                      </m:e>
+                    </m:d>
+                    <m:r>
+                      <a:rPr lang="en-US" i="1" dirty="0" smtClean="0">
+                        <a:latin typeface="Cambria Math" panose="02040503050406030204" pitchFamily="18" charset="0"/>
+                        <a:cs typeface="Arial" panose="020B0604020202020204" pitchFamily="34" charset="0"/>
+                        <a:sym typeface="Wingdings" panose="05000000000000000000" pitchFamily="2" charset="2"/>
+                      </a:rPr>
+                      <m:t>=</m:t>
+                    </m:r>
+                    <m:r>
+                      <a:rPr lang="en-US" b="0" i="1" dirty="0" smtClean="0">
+                        <a:latin typeface="Cambria Math" panose="02040503050406030204" pitchFamily="18" charset="0"/>
+                        <a:cs typeface="Arial" panose="020B0604020202020204" pitchFamily="34" charset="0"/>
+                        <a:sym typeface="Wingdings" panose="05000000000000000000" pitchFamily="2" charset="2"/>
+                      </a:rPr>
+                      <m:t>𝑍</m:t>
+                    </m:r>
+                    <m:d>
+                      <m:dPr>
+                        <m:begChr m:val="["/>
+                        <m:endChr m:val="]"/>
+                        <m:ctrlPr>
+                          <a:rPr lang="en-US" b="0" i="1" dirty="0" smtClean="0">
+                            <a:latin typeface="Cambria Math" panose="02040503050406030204" pitchFamily="18" charset="0"/>
+                            <a:cs typeface="Arial" panose="020B0604020202020204" pitchFamily="34" charset="0"/>
+                            <a:sym typeface="Wingdings" panose="05000000000000000000" pitchFamily="2" charset="2"/>
+                          </a:rPr>
+                        </m:ctrlPr>
+                      </m:dPr>
+                      <m:e>
+                        <m:r>
+                          <a:rPr lang="en-US" b="0" i="1" dirty="0" smtClean="0">
+                            <a:latin typeface="Cambria Math" panose="02040503050406030204" pitchFamily="18" charset="0"/>
+                            <a:cs typeface="Arial" panose="020B0604020202020204" pitchFamily="34" charset="0"/>
+                            <a:sym typeface="Wingdings" panose="05000000000000000000" pitchFamily="2" charset="2"/>
+                          </a:rPr>
+                          <m:t>𝑀</m:t>
+                        </m:r>
+                        <m:r>
+                          <a:rPr lang="en-US" b="0" i="1" dirty="0" smtClean="0">
+                            <a:latin typeface="Cambria Math" panose="02040503050406030204" pitchFamily="18" charset="0"/>
+                            <a:cs typeface="Arial" panose="020B0604020202020204" pitchFamily="34" charset="0"/>
+                            <a:sym typeface="Wingdings" panose="05000000000000000000" pitchFamily="2" charset="2"/>
+                          </a:rPr>
+                          <m:t>+1</m:t>
+                        </m:r>
+                      </m:e>
+                    </m:d>
+                    <m:r>
+                      <a:rPr lang="en-US" b="0" i="1" dirty="0" smtClean="0">
+                        <a:latin typeface="Cambria Math" panose="02040503050406030204" pitchFamily="18" charset="0"/>
+                        <a:cs typeface="Arial" panose="020B0604020202020204" pitchFamily="34" charset="0"/>
+                        <a:sym typeface="Wingdings" panose="05000000000000000000" pitchFamily="2" charset="2"/>
+                      </a:rPr>
+                      <m:t> </m:t>
+                    </m:r>
+                    <m:r>
+                      <a:rPr lang="en-GB" sz="2400" i="1" dirty="0">
+                        <a:latin typeface="Cambria Math" panose="02040503050406030204" pitchFamily="18" charset="0"/>
+                        <a:cs typeface="Arial" panose="020B0604020202020204" pitchFamily="34" charset="0"/>
+                        <a:sym typeface="Wingdings" panose="05000000000000000000" pitchFamily="2" charset="2"/>
+                      </a:rPr>
+                      <m:t> </m:t>
+                    </m:r>
+                    <m:r>
+                      <m:rPr>
+                        <m:sty m:val="p"/>
+                      </m:rPr>
+                      <a:rPr lang="en-GB" sz="2400" i="1" dirty="0">
+                        <a:latin typeface="Cambria Math" panose="02040503050406030204" pitchFamily="18" charset="0"/>
+                        <a:cs typeface="Arial" panose="020B0604020202020204" pitchFamily="34" charset="0"/>
+                        <a:sym typeface="Wingdings" panose="05000000000000000000" pitchFamily="2" charset="2"/>
+                      </a:rPr>
+                      <m:t>min</m:t>
+                    </m:r>
+                    <m:r>
+                      <a:rPr lang="en-US" sz="2400" i="1" dirty="0">
+                        <a:latin typeface="Cambria Math" panose="02040503050406030204" pitchFamily="18" charset="0"/>
+                        <a:cs typeface="Arial" panose="020B0604020202020204" pitchFamily="34" charset="0"/>
+                        <a:sym typeface="Wingdings" panose="05000000000000000000" pitchFamily="2" charset="2"/>
+                      </a:rPr>
+                      <m:t>⁡</m:t>
+                    </m:r>
+                  </m:oMath>
+                </a14:m>
+                <a:endParaRPr lang="en-US" dirty="0">
+                  <a:latin typeface="Arial" panose="020B0604020202020204" pitchFamily="34" charset="0"/>
+                  <a:cs typeface="Arial" panose="020B0604020202020204" pitchFamily="34" charset="0"/>
+                  <a:sym typeface="Wingdings" panose="05000000000000000000" pitchFamily="2" charset="2"/>
+                </a:endParaRPr>
+              </a:p>
+              <a:p>
+                <a:pPr lvl="1"/>
+                <a:endParaRPr lang="en-US" dirty="0">
+                  <a:latin typeface="Arial" panose="020B0604020202020204" pitchFamily="34" charset="0"/>
+                  <a:cs typeface="Arial" panose="020B0604020202020204" pitchFamily="34" charset="0"/>
+                </a:endParaRPr>
+              </a:p>
+              <a:p>
+                <a:pPr lvl="1"/>
+                <a:endParaRPr lang="en-US" dirty="0">
+                  <a:latin typeface="Arial" panose="020B0604020202020204" pitchFamily="34" charset="0"/>
+                  <a:cs typeface="Arial" panose="020B0604020202020204" pitchFamily="34" charset="0"/>
+                </a:endParaRPr>
+              </a:p>
+              <a:p>
+                <a:pPr lvl="1"/>
+                <a:endParaRPr lang="en-GB" dirty="0">
+                  <a:latin typeface="Times New Roman" pitchFamily="18" charset="0"/>
+                  <a:cs typeface="Times New Roman" pitchFamily="18" charset="0"/>
+                </a:endParaRPr>
+              </a:p>
+              <a:p>
+                <a:endParaRPr lang="en-GB" sz="2400" dirty="0"/>
+              </a:p>
+            </p:txBody>
+          </p:sp>
+        </mc:Choice>
+        <mc:Fallback>
+          <p:sp>
+            <p:nvSpPr>
+              <p:cNvPr id="3" name="Content Placeholder 2"/>
+              <p:cNvSpPr>
+                <a:spLocks noGrp="1" noRot="1" noChangeAspect="1" noMove="1" noResize="1" noEditPoints="1" noAdjustHandles="1" noChangeArrowheads="1" noChangeShapeType="1" noTextEdit="1"/>
+              </p:cNvSpPr>
+              <p:nvPr>
+                <p:ph idx="1"/>
+              </p:nvPr>
+            </p:nvSpPr>
+            <p:spPr>
+              <a:xfrm>
+                <a:off x="1847528" y="1447800"/>
+                <a:ext cx="8568952" cy="5005536"/>
+              </a:xfrm>
+              <a:blipFill>
+                <a:blip r:embed="rId3"/>
+                <a:stretch>
+                  <a:fillRect l="-1280" t="-2192"/>
+                </a:stretch>
+              </a:blipFill>
+            </p:spPr>
+            <p:txBody>
+              <a:bodyPr/>
+              <a:lstStyle/>
+              <a:p>
+                <a:r>
+                  <a:rPr lang="en-US">
+                    <a:noFill/>
+                  </a:rPr>
+                  <a:t> </a:t>
+                </a:r>
+              </a:p>
+            </p:txBody>
+          </p:sp>
+        </mc:Fallback>
+      </mc:AlternateContent>
+      <p:sp>
+        <p:nvSpPr>
+          <p:cNvPr id="4" name="Slide Number Placeholder 3"/>
+          <p:cNvSpPr>
+            <a:spLocks noGrp="1"/>
+          </p:cNvSpPr>
+          <p:nvPr>
+            <p:ph type="sldNum" sz="quarter" idx="12"/>
+          </p:nvPr>
+        </p:nvSpPr>
+        <p:spPr/>
+        <p:txBody>
+          <a:bodyPr/>
+          <a:lstStyle/>
+          <a:p>
+            <a:fld id="{A5B08488-2DBE-4E62-B7EE-BA7D2927C7BD}" type="slidenum">
+              <a:rPr lang="en-GB" smtClean="0"/>
+              <a:t>10</a:t>
+            </a:fld>
+            <a:endParaRPr lang="en-GB"/>
+          </a:p>
+        </p:txBody>
+      </p:sp>
+      <p:cxnSp>
+        <p:nvCxnSpPr>
+          <p:cNvPr id="5" name="Straight Connector 4"/>
+          <p:cNvCxnSpPr/>
+          <p:nvPr/>
+        </p:nvCxnSpPr>
+        <p:spPr>
+          <a:xfrm>
+            <a:off x="1847528" y="1268760"/>
+            <a:ext cx="8640960" cy="0"/>
+          </a:xfrm>
+          <a:prstGeom prst="line">
+            <a:avLst/>
+          </a:prstGeom>
+          <a:ln w="25400">
+            <a:solidFill>
+              <a:schemeClr val="accent1">
+                <a:lumMod val="60000"/>
+                <a:lumOff val="40000"/>
+              </a:schemeClr>
+            </a:solidFill>
+          </a:ln>
+        </p:spPr>
+        <p:style>
+          <a:lnRef idx="1">
+            <a:schemeClr val="accent1"/>
+          </a:lnRef>
+          <a:fillRef idx="0">
+            <a:schemeClr val="accent1"/>
+          </a:fillRef>
+          <a:effectRef idx="0">
+            <a:schemeClr val="accent1"/>
+          </a:effectRef>
+          <a:fontRef idx="minor">
+            <a:schemeClr val="tx1"/>
+          </a:fontRef>
+        </p:style>
+      </p:cxnSp>
+    </p:spTree>
+    <p:extLst>
+      <p:ext uri="{BB962C8B-B14F-4D97-AF65-F5344CB8AC3E}">
+        <p14:creationId xmlns:p14="http://schemas.microsoft.com/office/powerpoint/2010/main" val="568486946"/>
+      </p:ext>
+    </p:extLst>
+  </p:cSld>
+  <p:clrMapOvr>
+    <a:masterClrMapping/>
+  </p:clrMapOvr>
+</p:sld>
+</file>
+
 <file path=ppt/slides/slide2.xml><?xml version="1.0" encoding="utf-8"?>
 <p:sld xmlns:a="http://schemas.openxmlformats.org/drawingml/2006/main" xmlns:r="http://schemas.openxmlformats.org/officeDocument/2006/relationships" xmlns:p="http://schemas.openxmlformats.org/presentationml/2006/main">
   <p:cSld>
@@ -8349,8 +9584,8 @@
           </a:p>
         </p:txBody>
       </p:sp>
-      <mc:AlternateContent xmlns:mc="http://schemas.openxmlformats.org/markup-compatibility/2006">
-        <mc:Choice xmlns:a14="http://schemas.microsoft.com/office/drawing/2010/main" Requires="a14">
+      <mc:AlternateContent xmlns:mc="http://schemas.openxmlformats.org/markup-compatibility/2006" xmlns:a14="http://schemas.microsoft.com/office/drawing/2010/main">
+        <mc:Choice Requires="a14">
           <p:sp>
             <p:nvSpPr>
               <p:cNvPr id="3" name="Content Placeholder 2"/>
@@ -8585,14 +9820,7 @@
                                           <a:latin typeface="Cambria Math" panose="02040503050406030204" pitchFamily="18" charset="0"/>
                                           <a:sym typeface="Wingdings" panose="05000000000000000000" pitchFamily="2" charset="2"/>
                                         </a:rPr>
-                                        <m:t>=</m:t>
-                                      </m:r>
-                                      <m:r>
-                                        <a:rPr lang="en-US" sz="2000" i="1">
-                                          <a:latin typeface="Cambria Math" panose="02040503050406030204" pitchFamily="18" charset="0"/>
-                                          <a:sym typeface="Wingdings" panose="05000000000000000000" pitchFamily="2" charset="2"/>
-                                        </a:rPr>
-                                        <m:t>1</m:t>
+                                        <m:t>=1</m:t>
                                       </m:r>
                                     </m:sub>
                                     <m:sup>
@@ -9837,7 +11065,7 @@
             </p:txBody>
           </p:sp>
         </mc:Choice>
-        <mc:Fallback>
+        <mc:Fallback xmlns="">
           <p:sp>
             <p:nvSpPr>
               <p:cNvPr id="3" name="Content Placeholder 2"/>
@@ -10136,8 +11364,8 @@
           </a:p>
         </p:txBody>
       </p:sp>
-      <mc:AlternateContent xmlns:mc="http://schemas.openxmlformats.org/markup-compatibility/2006">
-        <mc:Choice xmlns:a14="http://schemas.microsoft.com/office/drawing/2010/main" Requires="a14">
+      <mc:AlternateContent xmlns:mc="http://schemas.openxmlformats.org/markup-compatibility/2006" xmlns:a14="http://schemas.microsoft.com/office/drawing/2010/main">
+        <mc:Choice Requires="a14">
           <p:sp>
             <p:nvSpPr>
               <p:cNvPr id="3" name="Content Placeholder 2"/>
@@ -12070,7 +13298,7 @@
             </p:txBody>
           </p:sp>
         </mc:Choice>
-        <mc:Fallback>
+        <mc:Fallback xmlns="">
           <p:sp>
             <p:nvSpPr>
               <p:cNvPr id="3" name="Content Placeholder 2"/>
@@ -14011,6 +15239,1888 @@
     <p:extLst>
       <p:ext uri="{BB962C8B-B14F-4D97-AF65-F5344CB8AC3E}">
         <p14:creationId xmlns:p14="http://schemas.microsoft.com/office/powerpoint/2010/main" val="49692623"/>
+      </p:ext>
+    </p:extLst>
+  </p:cSld>
+  <p:clrMapOvr>
+    <a:masterClrMapping/>
+  </p:clrMapOvr>
+</p:sld>
+</file>
+
+<file path=ppt/slides/slide8.xml><?xml version="1.0" encoding="utf-8"?>
+<p:sld xmlns:a="http://schemas.openxmlformats.org/drawingml/2006/main" xmlns:r="http://schemas.openxmlformats.org/officeDocument/2006/relationships" xmlns:p="http://schemas.openxmlformats.org/presentationml/2006/main">
+  <p:cSld>
+    <p:spTree>
+      <p:nvGrpSpPr>
+        <p:cNvPr id="1" name=""/>
+        <p:cNvGrpSpPr/>
+        <p:nvPr/>
+      </p:nvGrpSpPr>
+      <p:grpSpPr>
+        <a:xfrm>
+          <a:off x="0" y="0"/>
+          <a:ext cx="0" cy="0"/>
+          <a:chOff x="0" y="0"/>
+          <a:chExt cx="0" cy="0"/>
+        </a:xfrm>
+      </p:grpSpPr>
+      <p:sp>
+        <p:nvSpPr>
+          <p:cNvPr id="2" name="Title 1"/>
+          <p:cNvSpPr>
+            <a:spLocks noGrp="1"/>
+          </p:cNvSpPr>
+          <p:nvPr>
+            <p:ph type="title"/>
+          </p:nvPr>
+        </p:nvSpPr>
+        <p:spPr>
+          <a:xfrm>
+            <a:off x="1847528" y="116632"/>
+            <a:ext cx="8640960" cy="1143000"/>
+          </a:xfrm>
+        </p:spPr>
+        <p:txBody>
+          <a:bodyPr>
+            <a:noAutofit/>
+          </a:bodyPr>
+          <a:lstStyle/>
+          <a:p>
+            <a:pPr algn="ctr"/>
+            <a:r>
+              <a:rPr lang="en-US" sz="3600" dirty="0" err="1">
+                <a:solidFill>
+                  <a:schemeClr val="tx1"/>
+                </a:solidFill>
+                <a:latin typeface="Arial" panose="020B0604020202020204" pitchFamily="34" charset="0"/>
+                <a:cs typeface="Arial" panose="020B0604020202020204" pitchFamily="34" charset="0"/>
+              </a:rPr>
+              <a:t>Mô</a:t>
+            </a:r>
+            <a:r>
+              <a:rPr lang="en-US" sz="3600" dirty="0">
+                <a:solidFill>
+                  <a:schemeClr val="tx1"/>
+                </a:solidFill>
+                <a:latin typeface="Arial" panose="020B0604020202020204" pitchFamily="34" charset="0"/>
+                <a:cs typeface="Arial" panose="020B0604020202020204" pitchFamily="34" charset="0"/>
+              </a:rPr>
+              <a:t> </a:t>
+            </a:r>
+            <a:r>
+              <a:rPr lang="en-US" sz="3600" dirty="0" err="1">
+                <a:solidFill>
+                  <a:schemeClr val="tx1"/>
+                </a:solidFill>
+                <a:latin typeface="Arial" panose="020B0604020202020204" pitchFamily="34" charset="0"/>
+                <a:cs typeface="Arial" panose="020B0604020202020204" pitchFamily="34" charset="0"/>
+              </a:rPr>
+              <a:t>hình</a:t>
+            </a:r>
+            <a:r>
+              <a:rPr lang="en-US" sz="3600" dirty="0">
+                <a:solidFill>
+                  <a:schemeClr val="tx1"/>
+                </a:solidFill>
+                <a:latin typeface="Arial" panose="020B0604020202020204" pitchFamily="34" charset="0"/>
+                <a:cs typeface="Arial" panose="020B0604020202020204" pitchFamily="34" charset="0"/>
+              </a:rPr>
+              <a:t> </a:t>
+            </a:r>
+            <a:r>
+              <a:rPr lang="en-US" sz="3600" dirty="0" err="1">
+                <a:solidFill>
+                  <a:schemeClr val="tx1"/>
+                </a:solidFill>
+                <a:latin typeface="Arial" panose="020B0604020202020204" pitchFamily="34" charset="0"/>
+                <a:cs typeface="Arial" panose="020B0604020202020204" pitchFamily="34" charset="0"/>
+              </a:rPr>
+              <a:t>quy</a:t>
+            </a:r>
+            <a:r>
+              <a:rPr lang="en-US" sz="3600" dirty="0">
+                <a:solidFill>
+                  <a:schemeClr val="tx1"/>
+                </a:solidFill>
+                <a:latin typeface="Arial" panose="020B0604020202020204" pitchFamily="34" charset="0"/>
+                <a:cs typeface="Arial" panose="020B0604020202020204" pitchFamily="34" charset="0"/>
+              </a:rPr>
+              <a:t> </a:t>
+            </a:r>
+            <a:r>
+              <a:rPr lang="en-US" sz="3600" err="1">
+                <a:solidFill>
+                  <a:schemeClr val="tx1"/>
+                </a:solidFill>
+                <a:latin typeface="Arial" panose="020B0604020202020204" pitchFamily="34" charset="0"/>
+                <a:cs typeface="Arial" panose="020B0604020202020204" pitchFamily="34" charset="0"/>
+              </a:rPr>
+              <a:t>hoạch</a:t>
+            </a:r>
+            <a:r>
+              <a:rPr lang="en-US" sz="3600">
+                <a:solidFill>
+                  <a:schemeClr val="tx1"/>
+                </a:solidFill>
+                <a:latin typeface="Arial" panose="020B0604020202020204" pitchFamily="34" charset="0"/>
+                <a:cs typeface="Arial" panose="020B0604020202020204" pitchFamily="34" charset="0"/>
+              </a:rPr>
+              <a:t> </a:t>
+            </a:r>
+            <a:r>
+              <a:rPr lang="en-US" sz="3600" smtClean="0">
+                <a:latin typeface="Arial" panose="020B0604020202020204" pitchFamily="34" charset="0"/>
+                <a:cs typeface="Arial" panose="020B0604020202020204" pitchFamily="34" charset="0"/>
+              </a:rPr>
+              <a:t>ràng buộc </a:t>
+            </a:r>
+            <a:br>
+              <a:rPr lang="en-US" sz="3600" smtClean="0">
+                <a:latin typeface="Arial" panose="020B0604020202020204" pitchFamily="34" charset="0"/>
+                <a:cs typeface="Arial" panose="020B0604020202020204" pitchFamily="34" charset="0"/>
+              </a:rPr>
+            </a:br>
+            <a:r>
+              <a:rPr lang="en-US" sz="3600" smtClean="0">
+                <a:latin typeface="Arial" panose="020B0604020202020204" pitchFamily="34" charset="0"/>
+                <a:cs typeface="Arial" panose="020B0604020202020204" pitchFamily="34" charset="0"/>
+              </a:rPr>
+              <a:t>(Constraint Programming - CP)</a:t>
+            </a:r>
+            <a:endParaRPr lang="en-GB" sz="3600" dirty="0">
+              <a:solidFill>
+                <a:schemeClr val="tx1"/>
+              </a:solidFill>
+              <a:latin typeface="Arial" panose="020B0604020202020204" pitchFamily="34" charset="0"/>
+              <a:cs typeface="Arial" panose="020B0604020202020204" pitchFamily="34" charset="0"/>
+            </a:endParaRPr>
+          </a:p>
+        </p:txBody>
+      </p:sp>
+      <p:sp>
+        <p:nvSpPr>
+          <p:cNvPr id="3" name="Content Placeholder 2"/>
+          <p:cNvSpPr>
+            <a:spLocks noGrp="1"/>
+          </p:cNvSpPr>
+          <p:nvPr>
+            <p:ph idx="1"/>
+          </p:nvPr>
+        </p:nvSpPr>
+        <p:spPr>
+          <a:xfrm>
+            <a:off x="1847528" y="1447800"/>
+            <a:ext cx="8568952" cy="5005536"/>
+          </a:xfrm>
+        </p:spPr>
+        <p:txBody>
+          <a:bodyPr>
+            <a:normAutofit/>
+          </a:bodyPr>
+          <a:lstStyle/>
+          <a:p>
+            <a:r>
+              <a:rPr lang="en-US" dirty="0">
+                <a:latin typeface="Arial" panose="020B0604020202020204" pitchFamily="34" charset="0"/>
+                <a:cs typeface="Arial" panose="020B0604020202020204" pitchFamily="34" charset="0"/>
+              </a:rPr>
+              <a:t>Biến:</a:t>
+            </a:r>
+          </a:p>
+          <a:p>
+            <a:pPr lvl="1"/>
+            <a:r>
+              <a:rPr lang="en-US" smtClean="0">
+                <a:latin typeface="Arial" panose="020B0604020202020204" pitchFamily="34" charset="0"/>
+                <a:cs typeface="Arial" panose="020B0604020202020204" pitchFamily="34" charset="0"/>
+              </a:rPr>
+              <a:t>X[i] = j: j là điểm tiếp theo của i trên hành trình với mọi i = 0..M </a:t>
+            </a:r>
+            <a:r>
+              <a:rPr lang="en-US" dirty="0">
+                <a:latin typeface="Arial" panose="020B0604020202020204" pitchFamily="34" charset="0"/>
+                <a:cs typeface="Arial" panose="020B0604020202020204" pitchFamily="34" charset="0"/>
+              </a:rPr>
+              <a:t>(</a:t>
+            </a:r>
+            <a:r>
+              <a:rPr lang="en-US" dirty="0" err="1">
+                <a:latin typeface="Arial" panose="020B0604020202020204" pitchFamily="34" charset="0"/>
+                <a:cs typeface="Arial" panose="020B0604020202020204" pitchFamily="34" charset="0"/>
+              </a:rPr>
+              <a:t>coi</a:t>
+            </a:r>
+            <a:r>
+              <a:rPr lang="en-US" dirty="0">
+                <a:latin typeface="Arial" panose="020B0604020202020204" pitchFamily="34" charset="0"/>
+                <a:cs typeface="Arial" panose="020B0604020202020204" pitchFamily="34" charset="0"/>
+              </a:rPr>
+              <a:t> </a:t>
+            </a:r>
+            <a:r>
+              <a:rPr lang="en-US" dirty="0" err="1">
+                <a:latin typeface="Arial" panose="020B0604020202020204" pitchFamily="34" charset="0"/>
+                <a:cs typeface="Arial" panose="020B0604020202020204" pitchFamily="34" charset="0"/>
+              </a:rPr>
+              <a:t>điểm</a:t>
+            </a:r>
+            <a:r>
+              <a:rPr lang="en-US" dirty="0">
+                <a:latin typeface="Arial" panose="020B0604020202020204" pitchFamily="34" charset="0"/>
+                <a:cs typeface="Arial" panose="020B0604020202020204" pitchFamily="34" charset="0"/>
+              </a:rPr>
+              <a:t> M+1 </a:t>
+            </a:r>
+            <a:r>
+              <a:rPr lang="en-US" dirty="0" err="1">
+                <a:latin typeface="Arial" panose="020B0604020202020204" pitchFamily="34" charset="0"/>
+                <a:cs typeface="Arial" panose="020B0604020202020204" pitchFamily="34" charset="0"/>
+              </a:rPr>
+              <a:t>là</a:t>
+            </a:r>
+            <a:r>
+              <a:rPr lang="en-US" dirty="0">
+                <a:latin typeface="Arial" panose="020B0604020202020204" pitchFamily="34" charset="0"/>
+                <a:cs typeface="Arial" panose="020B0604020202020204" pitchFamily="34" charset="0"/>
+              </a:rPr>
+              <a:t> </a:t>
+            </a:r>
+            <a:r>
+              <a:rPr lang="en-US" dirty="0" err="1">
+                <a:latin typeface="Arial" panose="020B0604020202020204" pitchFamily="34" charset="0"/>
+                <a:cs typeface="Arial" panose="020B0604020202020204" pitchFamily="34" charset="0"/>
+              </a:rPr>
+              <a:t>điểm</a:t>
+            </a:r>
+            <a:r>
+              <a:rPr lang="en-US" dirty="0">
+                <a:latin typeface="Arial" panose="020B0604020202020204" pitchFamily="34" charset="0"/>
+                <a:cs typeface="Arial" panose="020B0604020202020204" pitchFamily="34" charset="0"/>
+              </a:rPr>
+              <a:t> </a:t>
+            </a:r>
+            <a:r>
+              <a:rPr lang="en-US" dirty="0" err="1">
+                <a:latin typeface="Arial" panose="020B0604020202020204" pitchFamily="34" charset="0"/>
+                <a:cs typeface="Arial" panose="020B0604020202020204" pitchFamily="34" charset="0"/>
+              </a:rPr>
+              <a:t>giả</a:t>
+            </a:r>
+            <a:r>
+              <a:rPr lang="en-US" dirty="0">
+                <a:latin typeface="Arial" panose="020B0604020202020204" pitchFamily="34" charset="0"/>
+                <a:cs typeface="Arial" panose="020B0604020202020204" pitchFamily="34" charset="0"/>
+              </a:rPr>
+              <a:t> </a:t>
+            </a:r>
+            <a:r>
+              <a:rPr lang="en-US" dirty="0" err="1">
+                <a:latin typeface="Arial" panose="020B0604020202020204" pitchFamily="34" charset="0"/>
+                <a:cs typeface="Arial" panose="020B0604020202020204" pitchFamily="34" charset="0"/>
+              </a:rPr>
+              <a:t>trùng</a:t>
+            </a:r>
+            <a:r>
+              <a:rPr lang="en-US" dirty="0">
+                <a:latin typeface="Arial" panose="020B0604020202020204" pitchFamily="34" charset="0"/>
+                <a:cs typeface="Arial" panose="020B0604020202020204" pitchFamily="34" charset="0"/>
+              </a:rPr>
+              <a:t> </a:t>
+            </a:r>
+            <a:r>
+              <a:rPr lang="en-US" dirty="0" err="1">
+                <a:latin typeface="Arial" panose="020B0604020202020204" pitchFamily="34" charset="0"/>
+                <a:cs typeface="Arial" panose="020B0604020202020204" pitchFamily="34" charset="0"/>
+              </a:rPr>
+              <a:t>điểm</a:t>
+            </a:r>
+            <a:r>
+              <a:rPr lang="en-US" dirty="0">
+                <a:latin typeface="Arial" panose="020B0604020202020204" pitchFamily="34" charset="0"/>
+                <a:cs typeface="Arial" panose="020B0604020202020204" pitchFamily="34" charset="0"/>
+              </a:rPr>
+              <a:t> 0)</a:t>
+            </a:r>
+          </a:p>
+          <a:p>
+            <a:pPr lvl="1"/>
+            <a:endParaRPr lang="en-US" dirty="0">
+              <a:latin typeface="Arial" panose="020B0604020202020204" pitchFamily="34" charset="0"/>
+              <a:cs typeface="Arial" panose="020B0604020202020204" pitchFamily="34" charset="0"/>
+            </a:endParaRPr>
+          </a:p>
+          <a:p>
+            <a:pPr lvl="1"/>
+            <a:r>
+              <a:rPr lang="en-US" dirty="0">
+                <a:latin typeface="Arial" panose="020B0604020202020204" pitchFamily="34" charset="0"/>
+                <a:cs typeface="Arial" panose="020B0604020202020204" pitchFamily="34" charset="0"/>
+              </a:rPr>
+              <a:t>Y[</a:t>
+            </a:r>
+            <a:r>
+              <a:rPr lang="en-US" dirty="0" err="1">
+                <a:latin typeface="Arial" panose="020B0604020202020204" pitchFamily="34" charset="0"/>
+                <a:cs typeface="Arial" panose="020B0604020202020204" pitchFamily="34" charset="0"/>
+              </a:rPr>
+              <a:t>i</a:t>
+            </a:r>
+            <a:r>
+              <a:rPr lang="en-US" dirty="0">
+                <a:latin typeface="Arial" panose="020B0604020202020204" pitchFamily="34" charset="0"/>
+                <a:cs typeface="Arial" panose="020B0604020202020204" pitchFamily="34" charset="0"/>
+              </a:rPr>
+              <a:t>] = 1 </a:t>
+            </a:r>
+            <a:r>
+              <a:rPr lang="en-US" dirty="0" err="1">
+                <a:latin typeface="Arial" panose="020B0604020202020204" pitchFamily="34" charset="0"/>
+                <a:cs typeface="Arial" panose="020B0604020202020204" pitchFamily="34" charset="0"/>
+              </a:rPr>
+              <a:t>nếu</a:t>
+            </a:r>
+            <a:r>
+              <a:rPr lang="en-US" dirty="0">
+                <a:latin typeface="Arial" panose="020B0604020202020204" pitchFamily="34" charset="0"/>
+                <a:cs typeface="Arial" panose="020B0604020202020204" pitchFamily="34" charset="0"/>
+              </a:rPr>
+              <a:t> </a:t>
+            </a:r>
+            <a:r>
+              <a:rPr lang="en-US" dirty="0" err="1">
+                <a:latin typeface="Arial" panose="020B0604020202020204" pitchFamily="34" charset="0"/>
+                <a:cs typeface="Arial" panose="020B0604020202020204" pitchFamily="34" charset="0"/>
+              </a:rPr>
+              <a:t>kệ</a:t>
+            </a:r>
+            <a:r>
+              <a:rPr lang="en-US" dirty="0">
+                <a:latin typeface="Arial" panose="020B0604020202020204" pitchFamily="34" charset="0"/>
+                <a:cs typeface="Arial" panose="020B0604020202020204" pitchFamily="34" charset="0"/>
+              </a:rPr>
+              <a:t> </a:t>
+            </a:r>
+            <a:r>
+              <a:rPr lang="en-US" dirty="0" err="1">
+                <a:latin typeface="Arial" panose="020B0604020202020204" pitchFamily="34" charset="0"/>
+                <a:cs typeface="Arial" panose="020B0604020202020204" pitchFamily="34" charset="0"/>
+              </a:rPr>
+              <a:t>i</a:t>
+            </a:r>
+            <a:r>
+              <a:rPr lang="en-US" dirty="0">
+                <a:latin typeface="Arial" panose="020B0604020202020204" pitchFamily="34" charset="0"/>
+                <a:cs typeface="Arial" panose="020B0604020202020204" pitchFamily="34" charset="0"/>
+              </a:rPr>
+              <a:t> </a:t>
+            </a:r>
+            <a:r>
+              <a:rPr lang="en-US" dirty="0" err="1">
+                <a:latin typeface="Arial" panose="020B0604020202020204" pitchFamily="34" charset="0"/>
+                <a:cs typeface="Arial" panose="020B0604020202020204" pitchFamily="34" charset="0"/>
+              </a:rPr>
+              <a:t>được</a:t>
+            </a:r>
+            <a:r>
+              <a:rPr lang="en-US" dirty="0">
+                <a:latin typeface="Arial" panose="020B0604020202020204" pitchFamily="34" charset="0"/>
+                <a:cs typeface="Arial" panose="020B0604020202020204" pitchFamily="34" charset="0"/>
+              </a:rPr>
+              <a:t> </a:t>
+            </a:r>
+            <a:r>
+              <a:rPr lang="en-US" dirty="0" err="1">
+                <a:latin typeface="Arial" panose="020B0604020202020204" pitchFamily="34" charset="0"/>
+                <a:cs typeface="Arial" panose="020B0604020202020204" pitchFamily="34" charset="0"/>
+              </a:rPr>
+              <a:t>đến</a:t>
+            </a:r>
+            <a:r>
+              <a:rPr lang="en-US" dirty="0">
+                <a:latin typeface="Arial" panose="020B0604020202020204" pitchFamily="34" charset="0"/>
+                <a:cs typeface="Arial" panose="020B0604020202020204" pitchFamily="34" charset="0"/>
+              </a:rPr>
+              <a:t>, </a:t>
+            </a:r>
+            <a:r>
+              <a:rPr lang="en-US" dirty="0" err="1">
+                <a:latin typeface="Arial" panose="020B0604020202020204" pitchFamily="34" charset="0"/>
+                <a:cs typeface="Arial" panose="020B0604020202020204" pitchFamily="34" charset="0"/>
+              </a:rPr>
+              <a:t>ngược</a:t>
+            </a:r>
+            <a:r>
+              <a:rPr lang="en-US" dirty="0">
+                <a:latin typeface="Arial" panose="020B0604020202020204" pitchFamily="34" charset="0"/>
+                <a:cs typeface="Arial" panose="020B0604020202020204" pitchFamily="34" charset="0"/>
+              </a:rPr>
+              <a:t> </a:t>
+            </a:r>
+            <a:r>
+              <a:rPr lang="en-US" dirty="0" err="1">
+                <a:latin typeface="Arial" panose="020B0604020202020204" pitchFamily="34" charset="0"/>
+                <a:cs typeface="Arial" panose="020B0604020202020204" pitchFamily="34" charset="0"/>
+              </a:rPr>
+              <a:t>lại</a:t>
+            </a:r>
+            <a:r>
+              <a:rPr lang="en-US" dirty="0">
+                <a:latin typeface="Arial" panose="020B0604020202020204" pitchFamily="34" charset="0"/>
+                <a:cs typeface="Arial" panose="020B0604020202020204" pitchFamily="34" charset="0"/>
+              </a:rPr>
+              <a:t> Y[</a:t>
+            </a:r>
+            <a:r>
+              <a:rPr lang="en-US" dirty="0" err="1">
+                <a:latin typeface="Arial" panose="020B0604020202020204" pitchFamily="34" charset="0"/>
+                <a:cs typeface="Arial" panose="020B0604020202020204" pitchFamily="34" charset="0"/>
+              </a:rPr>
+              <a:t>i</a:t>
+            </a:r>
+            <a:r>
+              <a:rPr lang="en-US" dirty="0">
+                <a:latin typeface="Arial" panose="020B0604020202020204" pitchFamily="34" charset="0"/>
+                <a:cs typeface="Arial" panose="020B0604020202020204" pitchFamily="34" charset="0"/>
+              </a:rPr>
+              <a:t>] = 0 </a:t>
+            </a:r>
+            <a:r>
+              <a:rPr lang="en-US" dirty="0" err="1">
+                <a:latin typeface="Arial" panose="020B0604020202020204" pitchFamily="34" charset="0"/>
+                <a:cs typeface="Arial" panose="020B0604020202020204" pitchFamily="34" charset="0"/>
+              </a:rPr>
+              <a:t>nếu</a:t>
+            </a:r>
+            <a:r>
+              <a:rPr lang="en-US" dirty="0">
+                <a:latin typeface="Arial" panose="020B0604020202020204" pitchFamily="34" charset="0"/>
+                <a:cs typeface="Arial" panose="020B0604020202020204" pitchFamily="34" charset="0"/>
+              </a:rPr>
+              <a:t> </a:t>
+            </a:r>
+            <a:r>
+              <a:rPr lang="en-US" dirty="0" err="1">
+                <a:latin typeface="Arial" panose="020B0604020202020204" pitchFamily="34" charset="0"/>
+                <a:cs typeface="Arial" panose="020B0604020202020204" pitchFamily="34" charset="0"/>
+              </a:rPr>
+              <a:t>kệ</a:t>
+            </a:r>
+            <a:r>
+              <a:rPr lang="en-US" dirty="0">
+                <a:latin typeface="Arial" panose="020B0604020202020204" pitchFamily="34" charset="0"/>
+                <a:cs typeface="Arial" panose="020B0604020202020204" pitchFamily="34" charset="0"/>
+              </a:rPr>
+              <a:t> </a:t>
+            </a:r>
+            <a:r>
+              <a:rPr lang="en-US" dirty="0" err="1">
+                <a:latin typeface="Arial" panose="020B0604020202020204" pitchFamily="34" charset="0"/>
+                <a:cs typeface="Arial" panose="020B0604020202020204" pitchFamily="34" charset="0"/>
+              </a:rPr>
+              <a:t>i</a:t>
+            </a:r>
+            <a:r>
+              <a:rPr lang="en-US" dirty="0">
+                <a:latin typeface="Arial" panose="020B0604020202020204" pitchFamily="34" charset="0"/>
+                <a:cs typeface="Arial" panose="020B0604020202020204" pitchFamily="34" charset="0"/>
+              </a:rPr>
+              <a:t> </a:t>
+            </a:r>
+            <a:r>
+              <a:rPr lang="en-US" dirty="0" err="1">
+                <a:latin typeface="Arial" panose="020B0604020202020204" pitchFamily="34" charset="0"/>
+                <a:cs typeface="Arial" panose="020B0604020202020204" pitchFamily="34" charset="0"/>
+              </a:rPr>
+              <a:t>không</a:t>
+            </a:r>
+            <a:r>
+              <a:rPr lang="en-US" dirty="0">
+                <a:latin typeface="Arial" panose="020B0604020202020204" pitchFamily="34" charset="0"/>
+                <a:cs typeface="Arial" panose="020B0604020202020204" pitchFamily="34" charset="0"/>
+              </a:rPr>
+              <a:t> </a:t>
+            </a:r>
+            <a:r>
+              <a:rPr lang="en-US" dirty="0" err="1">
+                <a:latin typeface="Arial" panose="020B0604020202020204" pitchFamily="34" charset="0"/>
+                <a:cs typeface="Arial" panose="020B0604020202020204" pitchFamily="34" charset="0"/>
+              </a:rPr>
+              <a:t>được</a:t>
+            </a:r>
+            <a:r>
+              <a:rPr lang="en-US" dirty="0">
+                <a:latin typeface="Arial" panose="020B0604020202020204" pitchFamily="34" charset="0"/>
+                <a:cs typeface="Arial" panose="020B0604020202020204" pitchFamily="34" charset="0"/>
+              </a:rPr>
+              <a:t> </a:t>
+            </a:r>
+            <a:r>
+              <a:rPr lang="en-US" dirty="0" err="1">
+                <a:latin typeface="Arial" panose="020B0604020202020204" pitchFamily="34" charset="0"/>
+                <a:cs typeface="Arial" panose="020B0604020202020204" pitchFamily="34" charset="0"/>
+              </a:rPr>
+              <a:t>đến</a:t>
+            </a:r>
+            <a:r>
+              <a:rPr lang="en-US" dirty="0">
+                <a:latin typeface="Arial" panose="020B0604020202020204" pitchFamily="34" charset="0"/>
+                <a:cs typeface="Arial" panose="020B0604020202020204" pitchFamily="34" charset="0"/>
+              </a:rPr>
+              <a:t> </a:t>
+            </a:r>
+            <a:r>
+              <a:rPr lang="en-US" dirty="0" err="1">
+                <a:latin typeface="Arial" panose="020B0604020202020204" pitchFamily="34" charset="0"/>
+                <a:cs typeface="Arial" panose="020B0604020202020204" pitchFamily="34" charset="0"/>
+              </a:rPr>
+              <a:t>với</a:t>
+            </a:r>
+            <a:r>
+              <a:rPr lang="en-US" dirty="0">
+                <a:latin typeface="Arial" panose="020B0604020202020204" pitchFamily="34" charset="0"/>
+                <a:cs typeface="Arial" panose="020B0604020202020204" pitchFamily="34" charset="0"/>
+              </a:rPr>
+              <a:t> </a:t>
+            </a:r>
+            <a:r>
+              <a:rPr lang="en-US" dirty="0" err="1">
+                <a:latin typeface="Arial" panose="020B0604020202020204" pitchFamily="34" charset="0"/>
+                <a:cs typeface="Arial" panose="020B0604020202020204" pitchFamily="34" charset="0"/>
+              </a:rPr>
+              <a:t>mọi</a:t>
+            </a:r>
+            <a:r>
+              <a:rPr lang="en-US" dirty="0">
+                <a:latin typeface="Arial" panose="020B0604020202020204" pitchFamily="34" charset="0"/>
+                <a:cs typeface="Arial" panose="020B0604020202020204" pitchFamily="34" charset="0"/>
+              </a:rPr>
+              <a:t> </a:t>
+            </a:r>
+            <a:r>
+              <a:rPr lang="en-US" dirty="0" err="1">
+                <a:latin typeface="Arial" panose="020B0604020202020204" pitchFamily="34" charset="0"/>
+                <a:cs typeface="Arial" panose="020B0604020202020204" pitchFamily="34" charset="0"/>
+              </a:rPr>
+              <a:t>i</a:t>
+            </a:r>
+            <a:r>
+              <a:rPr lang="en-US" dirty="0">
+                <a:latin typeface="Arial" panose="020B0604020202020204" pitchFamily="34" charset="0"/>
+                <a:cs typeface="Arial" panose="020B0604020202020204" pitchFamily="34" charset="0"/>
+              </a:rPr>
+              <a:t> = 0…M+1</a:t>
+            </a:r>
+          </a:p>
+          <a:p>
+            <a:pPr lvl="1"/>
+            <a:endParaRPr lang="en-US" dirty="0">
+              <a:latin typeface="Arial" panose="020B0604020202020204" pitchFamily="34" charset="0"/>
+              <a:cs typeface="Arial" panose="020B0604020202020204" pitchFamily="34" charset="0"/>
+            </a:endParaRPr>
+          </a:p>
+          <a:p>
+            <a:pPr lvl="1"/>
+            <a:r>
+              <a:rPr lang="en-US" dirty="0">
+                <a:latin typeface="Arial" panose="020B0604020202020204" pitchFamily="34" charset="0"/>
+                <a:cs typeface="Arial" panose="020B0604020202020204" pitchFamily="34" charset="0"/>
+              </a:rPr>
+              <a:t>Z[</a:t>
+            </a:r>
+            <a:r>
+              <a:rPr lang="en-US" dirty="0" err="1">
+                <a:latin typeface="Arial" panose="020B0604020202020204" pitchFamily="34" charset="0"/>
+                <a:cs typeface="Arial" panose="020B0604020202020204" pitchFamily="34" charset="0"/>
+              </a:rPr>
+              <a:t>i</a:t>
+            </a:r>
+            <a:r>
+              <a:rPr lang="en-US" dirty="0">
+                <a:latin typeface="Arial" panose="020B0604020202020204" pitchFamily="34" charset="0"/>
+                <a:cs typeface="Arial" panose="020B0604020202020204" pitchFamily="34" charset="0"/>
+              </a:rPr>
+              <a:t>]: </a:t>
+            </a:r>
+            <a:r>
+              <a:rPr lang="en-US" dirty="0" err="1">
+                <a:latin typeface="Arial" panose="020B0604020202020204" pitchFamily="34" charset="0"/>
+                <a:cs typeface="Arial" panose="020B0604020202020204" pitchFamily="34" charset="0"/>
+              </a:rPr>
+              <a:t>là</a:t>
+            </a:r>
+            <a:r>
+              <a:rPr lang="en-US" dirty="0">
+                <a:latin typeface="Arial" panose="020B0604020202020204" pitchFamily="34" charset="0"/>
+                <a:cs typeface="Arial" panose="020B0604020202020204" pitchFamily="34" charset="0"/>
+              </a:rPr>
+              <a:t> </a:t>
+            </a:r>
+            <a:r>
+              <a:rPr lang="en-US" dirty="0" err="1">
+                <a:latin typeface="Arial" panose="020B0604020202020204" pitchFamily="34" charset="0"/>
+                <a:cs typeface="Arial" panose="020B0604020202020204" pitchFamily="34" charset="0"/>
+              </a:rPr>
+              <a:t>tổng</a:t>
+            </a:r>
+            <a:r>
+              <a:rPr lang="en-US" dirty="0">
+                <a:latin typeface="Arial" panose="020B0604020202020204" pitchFamily="34" charset="0"/>
+                <a:cs typeface="Arial" panose="020B0604020202020204" pitchFamily="34" charset="0"/>
+              </a:rPr>
+              <a:t> </a:t>
+            </a:r>
+            <a:r>
+              <a:rPr lang="en-US" dirty="0" err="1">
+                <a:latin typeface="Arial" panose="020B0604020202020204" pitchFamily="34" charset="0"/>
+                <a:cs typeface="Arial" panose="020B0604020202020204" pitchFamily="34" charset="0"/>
+              </a:rPr>
+              <a:t>quãng</a:t>
+            </a:r>
+            <a:r>
+              <a:rPr lang="en-US" dirty="0">
+                <a:latin typeface="Arial" panose="020B0604020202020204" pitchFamily="34" charset="0"/>
+                <a:cs typeface="Arial" panose="020B0604020202020204" pitchFamily="34" charset="0"/>
+              </a:rPr>
+              <a:t> </a:t>
+            </a:r>
+            <a:r>
+              <a:rPr lang="en-US" dirty="0" err="1">
+                <a:latin typeface="Arial" panose="020B0604020202020204" pitchFamily="34" charset="0"/>
+                <a:cs typeface="Arial" panose="020B0604020202020204" pitchFamily="34" charset="0"/>
+              </a:rPr>
+              <a:t>đường</a:t>
+            </a:r>
+            <a:r>
+              <a:rPr lang="en-US" dirty="0">
+                <a:latin typeface="Arial" panose="020B0604020202020204" pitchFamily="34" charset="0"/>
+                <a:cs typeface="Arial" panose="020B0604020202020204" pitchFamily="34" charset="0"/>
+              </a:rPr>
+              <a:t> </a:t>
+            </a:r>
+            <a:r>
+              <a:rPr lang="en-US" dirty="0" err="1">
+                <a:latin typeface="Arial" panose="020B0604020202020204" pitchFamily="34" charset="0"/>
+                <a:cs typeface="Arial" panose="020B0604020202020204" pitchFamily="34" charset="0"/>
+              </a:rPr>
+              <a:t>đi</a:t>
+            </a:r>
+            <a:r>
+              <a:rPr lang="en-US" dirty="0">
+                <a:latin typeface="Arial" panose="020B0604020202020204" pitchFamily="34" charset="0"/>
+                <a:cs typeface="Arial" panose="020B0604020202020204" pitchFamily="34" charset="0"/>
+              </a:rPr>
+              <a:t> </a:t>
+            </a:r>
+            <a:r>
+              <a:rPr lang="en-US" dirty="0" err="1">
+                <a:latin typeface="Arial" panose="020B0604020202020204" pitchFamily="34" charset="0"/>
+                <a:cs typeface="Arial" panose="020B0604020202020204" pitchFamily="34" charset="0"/>
+              </a:rPr>
+              <a:t>từ</a:t>
+            </a:r>
+            <a:r>
+              <a:rPr lang="en-US" dirty="0">
+                <a:latin typeface="Arial" panose="020B0604020202020204" pitchFamily="34" charset="0"/>
+                <a:cs typeface="Arial" panose="020B0604020202020204" pitchFamily="34" charset="0"/>
+              </a:rPr>
+              <a:t> </a:t>
+            </a:r>
+            <a:r>
+              <a:rPr lang="en-US" dirty="0" err="1">
+                <a:latin typeface="Arial" panose="020B0604020202020204" pitchFamily="34" charset="0"/>
+                <a:cs typeface="Arial" panose="020B0604020202020204" pitchFamily="34" charset="0"/>
+              </a:rPr>
+              <a:t>điểm</a:t>
+            </a:r>
+            <a:r>
+              <a:rPr lang="en-US" dirty="0">
+                <a:latin typeface="Arial" panose="020B0604020202020204" pitchFamily="34" charset="0"/>
+                <a:cs typeface="Arial" panose="020B0604020202020204" pitchFamily="34" charset="0"/>
+              </a:rPr>
+              <a:t> 0 </a:t>
+            </a:r>
+            <a:r>
+              <a:rPr lang="en-US" dirty="0" err="1">
+                <a:latin typeface="Arial" panose="020B0604020202020204" pitchFamily="34" charset="0"/>
+                <a:cs typeface="Arial" panose="020B0604020202020204" pitchFamily="34" charset="0"/>
+              </a:rPr>
+              <a:t>đến</a:t>
+            </a:r>
+            <a:r>
+              <a:rPr lang="en-US" dirty="0">
+                <a:latin typeface="Arial" panose="020B0604020202020204" pitchFamily="34" charset="0"/>
+                <a:cs typeface="Arial" panose="020B0604020202020204" pitchFamily="34" charset="0"/>
+              </a:rPr>
+              <a:t> </a:t>
+            </a:r>
+            <a:r>
+              <a:rPr lang="en-US" dirty="0" err="1">
+                <a:latin typeface="Arial" panose="020B0604020202020204" pitchFamily="34" charset="0"/>
+                <a:cs typeface="Arial" panose="020B0604020202020204" pitchFamily="34" charset="0"/>
+              </a:rPr>
+              <a:t>kệ</a:t>
+            </a:r>
+            <a:r>
+              <a:rPr lang="en-US" dirty="0">
+                <a:latin typeface="Arial" panose="020B0604020202020204" pitchFamily="34" charset="0"/>
+                <a:cs typeface="Arial" panose="020B0604020202020204" pitchFamily="34" charset="0"/>
+              </a:rPr>
+              <a:t> </a:t>
+            </a:r>
+            <a:r>
+              <a:rPr lang="en-US" dirty="0" err="1">
+                <a:latin typeface="Arial" panose="020B0604020202020204" pitchFamily="34" charset="0"/>
+                <a:cs typeface="Arial" panose="020B0604020202020204" pitchFamily="34" charset="0"/>
+              </a:rPr>
+              <a:t>i</a:t>
+            </a:r>
+            <a:r>
+              <a:rPr lang="en-US" dirty="0">
+                <a:latin typeface="Arial" panose="020B0604020202020204" pitchFamily="34" charset="0"/>
+                <a:cs typeface="Arial" panose="020B0604020202020204" pitchFamily="34" charset="0"/>
+              </a:rPr>
+              <a:t>, </a:t>
+            </a:r>
+            <a:r>
+              <a:rPr lang="en-US" dirty="0" err="1">
+                <a:latin typeface="Arial" panose="020B0604020202020204" pitchFamily="34" charset="0"/>
+                <a:cs typeface="Arial" panose="020B0604020202020204" pitchFamily="34" charset="0"/>
+              </a:rPr>
+              <a:t>với</a:t>
+            </a:r>
+            <a:r>
+              <a:rPr lang="en-US" dirty="0">
+                <a:latin typeface="Arial" panose="020B0604020202020204" pitchFamily="34" charset="0"/>
+                <a:cs typeface="Arial" panose="020B0604020202020204" pitchFamily="34" charset="0"/>
+              </a:rPr>
+              <a:t> </a:t>
+            </a:r>
+            <a:r>
+              <a:rPr lang="en-US" dirty="0" err="1">
+                <a:latin typeface="Arial" panose="020B0604020202020204" pitchFamily="34" charset="0"/>
+                <a:cs typeface="Arial" panose="020B0604020202020204" pitchFamily="34" charset="0"/>
+              </a:rPr>
+              <a:t>i</a:t>
+            </a:r>
+            <a:r>
+              <a:rPr lang="en-US" dirty="0">
+                <a:latin typeface="Arial" panose="020B0604020202020204" pitchFamily="34" charset="0"/>
+                <a:cs typeface="Arial" panose="020B0604020202020204" pitchFamily="34" charset="0"/>
+              </a:rPr>
+              <a:t> = 0..M+1</a:t>
+            </a:r>
+          </a:p>
+          <a:p>
+            <a:pPr lvl="1"/>
+            <a:endParaRPr lang="en-US" dirty="0">
+              <a:latin typeface="Arial" panose="020B0604020202020204" pitchFamily="34" charset="0"/>
+              <a:cs typeface="Arial" panose="020B0604020202020204" pitchFamily="34" charset="0"/>
+            </a:endParaRPr>
+          </a:p>
+          <a:p>
+            <a:pPr lvl="1"/>
+            <a:endParaRPr lang="en-GB" dirty="0">
+              <a:latin typeface="Times New Roman" pitchFamily="18" charset="0"/>
+              <a:cs typeface="Times New Roman" pitchFamily="18" charset="0"/>
+            </a:endParaRPr>
+          </a:p>
+          <a:p>
+            <a:endParaRPr lang="en-GB" sz="2400" dirty="0"/>
+          </a:p>
+        </p:txBody>
+      </p:sp>
+      <p:sp>
+        <p:nvSpPr>
+          <p:cNvPr id="4" name="Slide Number Placeholder 3"/>
+          <p:cNvSpPr>
+            <a:spLocks noGrp="1"/>
+          </p:cNvSpPr>
+          <p:nvPr>
+            <p:ph type="sldNum" sz="quarter" idx="12"/>
+          </p:nvPr>
+        </p:nvSpPr>
+        <p:spPr/>
+        <p:txBody>
+          <a:bodyPr/>
+          <a:lstStyle/>
+          <a:p>
+            <a:fld id="{A5B08488-2DBE-4E62-B7EE-BA7D2927C7BD}" type="slidenum">
+              <a:rPr lang="en-GB" smtClean="0"/>
+              <a:t>8</a:t>
+            </a:fld>
+            <a:endParaRPr lang="en-GB"/>
+          </a:p>
+        </p:txBody>
+      </p:sp>
+      <p:cxnSp>
+        <p:nvCxnSpPr>
+          <p:cNvPr id="5" name="Straight Connector 4"/>
+          <p:cNvCxnSpPr/>
+          <p:nvPr/>
+        </p:nvCxnSpPr>
+        <p:spPr>
+          <a:xfrm>
+            <a:off x="1847528" y="1268760"/>
+            <a:ext cx="8640960" cy="0"/>
+          </a:xfrm>
+          <a:prstGeom prst="line">
+            <a:avLst/>
+          </a:prstGeom>
+          <a:ln w="25400">
+            <a:solidFill>
+              <a:schemeClr val="accent1">
+                <a:lumMod val="60000"/>
+                <a:lumOff val="40000"/>
+              </a:schemeClr>
+            </a:solidFill>
+          </a:ln>
+        </p:spPr>
+        <p:style>
+          <a:lnRef idx="1">
+            <a:schemeClr val="accent1"/>
+          </a:lnRef>
+          <a:fillRef idx="0">
+            <a:schemeClr val="accent1"/>
+          </a:fillRef>
+          <a:effectRef idx="0">
+            <a:schemeClr val="accent1"/>
+          </a:effectRef>
+          <a:fontRef idx="minor">
+            <a:schemeClr val="tx1"/>
+          </a:fontRef>
+        </p:style>
+      </p:cxnSp>
+    </p:spTree>
+    <p:extLst>
+      <p:ext uri="{BB962C8B-B14F-4D97-AF65-F5344CB8AC3E}">
+        <p14:creationId xmlns:p14="http://schemas.microsoft.com/office/powerpoint/2010/main" val="4143204872"/>
+      </p:ext>
+    </p:extLst>
+  </p:cSld>
+  <p:clrMapOvr>
+    <a:masterClrMapping/>
+  </p:clrMapOvr>
+</p:sld>
+</file>
+
+<file path=ppt/slides/slide9.xml><?xml version="1.0" encoding="utf-8"?>
+<p:sld xmlns:a="http://schemas.openxmlformats.org/drawingml/2006/main" xmlns:r="http://schemas.openxmlformats.org/officeDocument/2006/relationships" xmlns:p="http://schemas.openxmlformats.org/presentationml/2006/main">
+  <p:cSld>
+    <p:spTree>
+      <p:nvGrpSpPr>
+        <p:cNvPr id="1" name=""/>
+        <p:cNvGrpSpPr/>
+        <p:nvPr/>
+      </p:nvGrpSpPr>
+      <p:grpSpPr>
+        <a:xfrm>
+          <a:off x="0" y="0"/>
+          <a:ext cx="0" cy="0"/>
+          <a:chOff x="0" y="0"/>
+          <a:chExt cx="0" cy="0"/>
+        </a:xfrm>
+      </p:grpSpPr>
+      <p:sp>
+        <p:nvSpPr>
+          <p:cNvPr id="2" name="Title 1"/>
+          <p:cNvSpPr>
+            <a:spLocks noGrp="1"/>
+          </p:cNvSpPr>
+          <p:nvPr>
+            <p:ph type="title"/>
+          </p:nvPr>
+        </p:nvSpPr>
+        <p:spPr>
+          <a:xfrm>
+            <a:off x="1847528" y="116632"/>
+            <a:ext cx="8640960" cy="1143000"/>
+          </a:xfrm>
+        </p:spPr>
+        <p:txBody>
+          <a:bodyPr>
+            <a:noAutofit/>
+          </a:bodyPr>
+          <a:lstStyle/>
+          <a:p>
+            <a:pPr algn="ctr"/>
+            <a:r>
+              <a:rPr lang="en-US" sz="3600">
+                <a:latin typeface="Arial" panose="020B0604020202020204" pitchFamily="34" charset="0"/>
+                <a:cs typeface="Arial" panose="020B0604020202020204" pitchFamily="34" charset="0"/>
+              </a:rPr>
+              <a:t>Mô hình quy hoạch ràng buộc </a:t>
+            </a:r>
+            <a:br>
+              <a:rPr lang="en-US" sz="3600">
+                <a:latin typeface="Arial" panose="020B0604020202020204" pitchFamily="34" charset="0"/>
+                <a:cs typeface="Arial" panose="020B0604020202020204" pitchFamily="34" charset="0"/>
+              </a:rPr>
+            </a:br>
+            <a:r>
+              <a:rPr lang="en-US" sz="3600">
+                <a:latin typeface="Arial" panose="020B0604020202020204" pitchFamily="34" charset="0"/>
+                <a:cs typeface="Arial" panose="020B0604020202020204" pitchFamily="34" charset="0"/>
+              </a:rPr>
+              <a:t>(Constraint Programming - CP)</a:t>
+            </a:r>
+            <a:endParaRPr lang="en-GB" sz="3600" dirty="0">
+              <a:solidFill>
+                <a:schemeClr val="tx1"/>
+              </a:solidFill>
+              <a:latin typeface="Arial" panose="020B0604020202020204" pitchFamily="34" charset="0"/>
+              <a:cs typeface="Arial" panose="020B0604020202020204" pitchFamily="34" charset="0"/>
+            </a:endParaRPr>
+          </a:p>
+        </p:txBody>
+      </p:sp>
+      <mc:AlternateContent xmlns:mc="http://schemas.openxmlformats.org/markup-compatibility/2006">
+        <mc:Choice xmlns:a14="http://schemas.microsoft.com/office/drawing/2010/main" Requires="a14">
+          <p:sp>
+            <p:nvSpPr>
+              <p:cNvPr id="3" name="Content Placeholder 2"/>
+              <p:cNvSpPr>
+                <a:spLocks noGrp="1"/>
+              </p:cNvSpPr>
+              <p:nvPr>
+                <p:ph idx="1"/>
+              </p:nvPr>
+            </p:nvSpPr>
+            <p:spPr>
+              <a:xfrm>
+                <a:off x="1847528" y="1447800"/>
+                <a:ext cx="8568952" cy="5005536"/>
+              </a:xfrm>
+            </p:spPr>
+            <p:txBody>
+              <a:bodyPr>
+                <a:normAutofit/>
+              </a:bodyPr>
+              <a:lstStyle/>
+              <a:p>
+                <a:r>
+                  <a:rPr lang="en-US" dirty="0" smtClean="0">
+                    <a:latin typeface="Arial" panose="020B0604020202020204" pitchFamily="34" charset="0"/>
+                    <a:cs typeface="Arial" panose="020B0604020202020204" pitchFamily="34" charset="0"/>
+                  </a:rPr>
+                  <a:t>Ràng </a:t>
+                </a:r>
+                <a:r>
+                  <a:rPr lang="en-US" dirty="0" err="1">
+                    <a:latin typeface="Arial" panose="020B0604020202020204" pitchFamily="34" charset="0"/>
+                    <a:cs typeface="Arial" panose="020B0604020202020204" pitchFamily="34" charset="0"/>
+                  </a:rPr>
+                  <a:t>buộc</a:t>
+                </a:r>
+                <a:endParaRPr lang="en-US" dirty="0">
+                  <a:latin typeface="Arial" panose="020B0604020202020204" pitchFamily="34" charset="0"/>
+                  <a:cs typeface="Arial" panose="020B0604020202020204" pitchFamily="34" charset="0"/>
+                </a:endParaRPr>
+              </a:p>
+              <a:p>
+                <a:pPr marL="0" indent="0">
+                  <a:buNone/>
+                </a:pPr>
+                <a:r>
+                  <a:rPr lang="en-US" sz="2000" smtClean="0">
+                    <a:latin typeface="Arial" panose="020B0604020202020204" pitchFamily="34" charset="0"/>
+                    <a:cs typeface="Arial" panose="020B0604020202020204" pitchFamily="34" charset="0"/>
+                  </a:rPr>
+                  <a:t>1. </a:t>
+                </a:r>
+                <a14:m>
+                  <m:oMath xmlns:m="http://schemas.openxmlformats.org/officeDocument/2006/math">
+                    <m:d>
+                      <m:dPr>
+                        <m:begChr m:val="{"/>
+                        <m:endChr m:val=""/>
+                        <m:ctrlPr>
+                          <a:rPr lang="en-US" sz="2000" i="1" smtClean="0">
+                            <a:solidFill>
+                              <a:schemeClr val="tx1"/>
+                            </a:solidFill>
+                            <a:latin typeface="Cambria Math" panose="02040503050406030204" pitchFamily="18" charset="0"/>
+                            <a:cs typeface="Arial" panose="020B0604020202020204" pitchFamily="34" charset="0"/>
+                          </a:rPr>
+                        </m:ctrlPr>
+                      </m:dPr>
+                      <m:e>
+                        <m:eqArr>
+                          <m:eqArrPr>
+                            <m:ctrlPr>
+                              <a:rPr lang="en-US" sz="2000" i="1" smtClean="0">
+                                <a:solidFill>
+                                  <a:schemeClr val="tx1"/>
+                                </a:solidFill>
+                                <a:latin typeface="Cambria Math" panose="02040503050406030204" pitchFamily="18" charset="0"/>
+                                <a:cs typeface="Arial" panose="020B0604020202020204" pitchFamily="34" charset="0"/>
+                              </a:rPr>
+                            </m:ctrlPr>
+                          </m:eqArrPr>
+                          <m:e>
+                            <m:r>
+                              <m:rPr>
+                                <m:sty m:val="p"/>
+                              </m:rPr>
+                              <a:rPr lang="en-US" sz="2000" dirty="0">
+                                <a:latin typeface="Cambria Math" panose="02040503050406030204" pitchFamily="18" charset="0"/>
+                              </a:rPr>
+                              <m:t>Y</m:t>
+                            </m:r>
+                            <m:d>
+                              <m:dPr>
+                                <m:begChr m:val="["/>
+                                <m:endChr m:val="]"/>
+                                <m:ctrlPr>
+                                  <a:rPr lang="en-US" sz="2000" i="1" dirty="0">
+                                    <a:latin typeface="Cambria Math" panose="02040503050406030204" pitchFamily="18" charset="0"/>
+                                  </a:rPr>
+                                </m:ctrlPr>
+                              </m:dPr>
+                              <m:e>
+                                <m:r>
+                                  <a:rPr lang="en-US" sz="2000" i="1" dirty="0">
+                                    <a:latin typeface="Cambria Math" panose="02040503050406030204" pitchFamily="18" charset="0"/>
+                                  </a:rPr>
+                                  <m:t>0</m:t>
+                                </m:r>
+                              </m:e>
+                            </m:d>
+                            <m:r>
+                              <a:rPr lang="en-US" sz="2000" i="1" dirty="0">
+                                <a:latin typeface="Cambria Math" panose="02040503050406030204" pitchFamily="18" charset="0"/>
+                              </a:rPr>
+                              <m:t>=</m:t>
+                            </m:r>
+                            <m:r>
+                              <a:rPr lang="en-US" sz="2000" i="1" dirty="0">
+                                <a:latin typeface="Cambria Math" panose="02040503050406030204" pitchFamily="18" charset="0"/>
+                              </a:rPr>
+                              <m:t>𝑌</m:t>
+                            </m:r>
+                            <m:d>
+                              <m:dPr>
+                                <m:begChr m:val="["/>
+                                <m:endChr m:val="]"/>
+                                <m:ctrlPr>
+                                  <a:rPr lang="en-US" sz="2000" i="1" dirty="0">
+                                    <a:latin typeface="Cambria Math" panose="02040503050406030204" pitchFamily="18" charset="0"/>
+                                  </a:rPr>
+                                </m:ctrlPr>
+                              </m:dPr>
+                              <m:e>
+                                <m:r>
+                                  <a:rPr lang="en-US" sz="2000" i="1" dirty="0">
+                                    <a:latin typeface="Cambria Math" panose="02040503050406030204" pitchFamily="18" charset="0"/>
+                                  </a:rPr>
+                                  <m:t>𝑀</m:t>
+                                </m:r>
+                                <m:r>
+                                  <a:rPr lang="en-US" sz="2000" i="1" dirty="0">
+                                    <a:latin typeface="Cambria Math" panose="02040503050406030204" pitchFamily="18" charset="0"/>
+                                  </a:rPr>
+                                  <m:t>+1</m:t>
+                                </m:r>
+                              </m:e>
+                            </m:d>
+                            <m:r>
+                              <a:rPr lang="en-US" sz="2000" i="1" dirty="0">
+                                <a:latin typeface="Cambria Math" panose="02040503050406030204" pitchFamily="18" charset="0"/>
+                              </a:rPr>
+                              <m:t>=1</m:t>
+                            </m:r>
+                          </m:e>
+                          <m:e>
+                            <m:r>
+                              <a:rPr lang="en-US" sz="2000" i="1">
+                                <a:latin typeface="Cambria Math" panose="02040503050406030204" pitchFamily="18" charset="0"/>
+                                <a:sym typeface="Wingdings" panose="05000000000000000000" pitchFamily="2" charset="2"/>
+                              </a:rPr>
+                              <m:t>𝑍</m:t>
+                            </m:r>
+                            <m:d>
+                              <m:dPr>
+                                <m:begChr m:val="["/>
+                                <m:endChr m:val="]"/>
+                                <m:ctrlPr>
+                                  <a:rPr lang="en-US" sz="2000" i="1">
+                                    <a:latin typeface="Cambria Math" panose="02040503050406030204" pitchFamily="18" charset="0"/>
+                                    <a:sym typeface="Wingdings" panose="05000000000000000000" pitchFamily="2" charset="2"/>
+                                  </a:rPr>
+                                </m:ctrlPr>
+                              </m:dPr>
+                              <m:e>
+                                <m:r>
+                                  <a:rPr lang="en-US" sz="2000" i="1">
+                                    <a:latin typeface="Cambria Math" panose="02040503050406030204" pitchFamily="18" charset="0"/>
+                                    <a:sym typeface="Wingdings" panose="05000000000000000000" pitchFamily="2" charset="2"/>
+                                  </a:rPr>
+                                  <m:t>0</m:t>
+                                </m:r>
+                              </m:e>
+                            </m:d>
+                            <m:r>
+                              <a:rPr lang="en-US" sz="2000" i="1">
+                                <a:latin typeface="Cambria Math" panose="02040503050406030204" pitchFamily="18" charset="0"/>
+                                <a:sym typeface="Wingdings" panose="05000000000000000000" pitchFamily="2" charset="2"/>
+                              </a:rPr>
+                              <m:t>=0</m:t>
+                            </m:r>
+                          </m:e>
+                        </m:eqArr>
+                      </m:e>
+                    </m:d>
+                  </m:oMath>
+                </a14:m>
+                <a:endParaRPr lang="en-US" sz="2000" dirty="0" smtClean="0">
+                  <a:solidFill>
+                    <a:schemeClr val="tx1"/>
+                  </a:solidFill>
+                  <a:latin typeface="Arial" panose="020B0604020202020204" pitchFamily="34" charset="0"/>
+                  <a:cs typeface="Arial" panose="020B0604020202020204" pitchFamily="34" charset="0"/>
+                </a:endParaRPr>
+              </a:p>
+              <a:p>
+                <a:pPr marL="0" indent="0">
+                  <a:buNone/>
+                </a:pPr>
+                <a:endParaRPr lang="en-US" sz="2000">
+                  <a:latin typeface="Arial" panose="020B0604020202020204" pitchFamily="34" charset="0"/>
+                  <a:cs typeface="Arial" panose="020B0604020202020204" pitchFamily="34" charset="0"/>
+                </a:endParaRPr>
+              </a:p>
+              <a:p>
+                <a:pPr marL="0" indent="0">
+                  <a:buNone/>
+                </a:pPr>
+                <a:r>
+                  <a:rPr lang="en-US" sz="2000" smtClean="0">
+                    <a:solidFill>
+                      <a:schemeClr val="tx1"/>
+                    </a:solidFill>
+                    <a:latin typeface="Arial" panose="020B0604020202020204" pitchFamily="34" charset="0"/>
+                    <a:cs typeface="Arial" panose="020B0604020202020204" pitchFamily="34" charset="0"/>
+                  </a:rPr>
+                  <a:t>2. X[i] != i </a:t>
+                </a:r>
+                <a14:m>
+                  <m:oMath xmlns:m="http://schemas.openxmlformats.org/officeDocument/2006/math">
+                    <m:r>
+                      <a:rPr lang="en-GB" sz="2000" i="1" dirty="0">
+                        <a:latin typeface="Cambria Math" panose="02040503050406030204" pitchFamily="18" charset="0"/>
+                        <a:cs typeface="Arial" panose="020B0604020202020204" pitchFamily="34" charset="0"/>
+                        <a:sym typeface="Symbol" panose="05050102010706020507" pitchFamily="18" charset="2"/>
+                      </a:rPr>
+                      <m:t></m:t>
+                    </m:r>
+                  </m:oMath>
+                </a14:m>
+                <a:r>
+                  <a:rPr lang="en-US" sz="2000" dirty="0" smtClean="0">
+                    <a:solidFill>
+                      <a:schemeClr val="tx1"/>
+                    </a:solidFill>
+                    <a:latin typeface="Arial" panose="020B0604020202020204" pitchFamily="34" charset="0"/>
+                    <a:cs typeface="Arial" panose="020B0604020202020204" pitchFamily="34" charset="0"/>
+                  </a:rPr>
+                  <a:t> </a:t>
+                </a:r>
+                <a:r>
+                  <a:rPr lang="en-US" sz="2000" smtClean="0">
+                    <a:solidFill>
+                      <a:schemeClr val="tx1"/>
+                    </a:solidFill>
+                    <a:latin typeface="Arial" panose="020B0604020202020204" pitchFamily="34" charset="0"/>
+                    <a:cs typeface="Arial" panose="020B0604020202020204" pitchFamily="34" charset="0"/>
+                  </a:rPr>
+                  <a:t>i = 0..M</a:t>
+                </a:r>
+              </a:p>
+              <a:p>
+                <a:pPr marL="0" indent="0">
+                  <a:buNone/>
+                </a:pPr>
+                <a:endParaRPr lang="en-US" sz="2000">
+                  <a:latin typeface="Arial" panose="020B0604020202020204" pitchFamily="34" charset="0"/>
+                  <a:cs typeface="Arial" panose="020B0604020202020204" pitchFamily="34" charset="0"/>
+                </a:endParaRPr>
+              </a:p>
+              <a:p>
+                <a:pPr marL="0" indent="0">
+                  <a:buNone/>
+                </a:pPr>
+                <a:r>
+                  <a:rPr lang="en-US" sz="2000" smtClean="0">
+                    <a:solidFill>
+                      <a:schemeClr val="tx1"/>
+                    </a:solidFill>
+                    <a:latin typeface="Arial" panose="020B0604020202020204" pitchFamily="34" charset="0"/>
+                    <a:cs typeface="Arial" panose="020B0604020202020204" pitchFamily="34" charset="0"/>
+                  </a:rPr>
+                  <a:t>3. X[i] != X[j] </a:t>
+                </a:r>
+                <a14:m>
+                  <m:oMath xmlns:m="http://schemas.openxmlformats.org/officeDocument/2006/math">
+                    <m:r>
+                      <a:rPr lang="en-GB" sz="2000" i="1" dirty="0">
+                        <a:latin typeface="Cambria Math" panose="02040503050406030204" pitchFamily="18" charset="0"/>
+                        <a:cs typeface="Arial" panose="020B0604020202020204" pitchFamily="34" charset="0"/>
+                        <a:sym typeface="Symbol" panose="05050102010706020507" pitchFamily="18" charset="2"/>
+                      </a:rPr>
+                      <m:t></m:t>
+                    </m:r>
+                  </m:oMath>
+                </a14:m>
+                <a:r>
+                  <a:rPr lang="en-US" sz="2000" dirty="0" smtClean="0">
+                    <a:solidFill>
+                      <a:schemeClr val="tx1"/>
+                    </a:solidFill>
+                    <a:latin typeface="Arial" panose="020B0604020202020204" pitchFamily="34" charset="0"/>
+                    <a:cs typeface="Arial" panose="020B0604020202020204" pitchFamily="34" charset="0"/>
+                  </a:rPr>
+                  <a:t> </a:t>
+                </a:r>
+                <a:r>
+                  <a:rPr lang="en-US" sz="2000" dirty="0" smtClean="0">
+                    <a:latin typeface="Arial" panose="020B0604020202020204" pitchFamily="34" charset="0"/>
+                    <a:cs typeface="Arial" panose="020B0604020202020204" pitchFamily="34" charset="0"/>
+                  </a:rPr>
+                  <a:t>0</a:t>
+                </a:r>
+                <a:r>
+                  <a:rPr lang="en-US" sz="2000" smtClean="0">
+                    <a:latin typeface="Arial" panose="020B0604020202020204" pitchFamily="34" charset="0"/>
+                    <a:cs typeface="Arial" panose="020B0604020202020204" pitchFamily="34" charset="0"/>
+                  </a:rPr>
+                  <a:t> </a:t>
+                </a:r>
+                <a:r>
+                  <a:rPr lang="en-US" sz="2000">
+                    <a:latin typeface="Arial" panose="020B0604020202020204" pitchFamily="34" charset="0"/>
+                    <a:cs typeface="Arial" panose="020B0604020202020204" pitchFamily="34" charset="0"/>
+                  </a:rPr>
+                  <a:t>≤ </a:t>
+                </a:r>
+                <a:r>
+                  <a:rPr lang="en-US" sz="2000">
+                    <a:latin typeface="Arial" panose="020B0604020202020204" pitchFamily="34" charset="0"/>
+                    <a:cs typeface="Arial" panose="020B0604020202020204" pitchFamily="34" charset="0"/>
+                  </a:rPr>
+                  <a:t>i </a:t>
+                </a:r>
+                <a:r>
+                  <a:rPr lang="en-US" sz="2000">
+                    <a:latin typeface="Arial" panose="020B0604020202020204" pitchFamily="34" charset="0"/>
+                    <a:cs typeface="Arial" panose="020B0604020202020204" pitchFamily="34" charset="0"/>
+                  </a:rPr>
+                  <a:t>&lt;</a:t>
+                </a:r>
+                <a:r>
+                  <a:rPr lang="en-US" sz="2000" smtClean="0">
+                    <a:latin typeface="Arial" panose="020B0604020202020204" pitchFamily="34" charset="0"/>
+                    <a:cs typeface="Arial" panose="020B0604020202020204" pitchFamily="34" charset="0"/>
+                  </a:rPr>
+                  <a:t> j ≤ M</a:t>
+                </a:r>
+              </a:p>
+              <a:p>
+                <a:pPr marL="0" indent="0">
+                  <a:buNone/>
+                </a:pPr>
+                <a:endParaRPr lang="en-US" sz="2000" dirty="0">
+                  <a:latin typeface="Arial" panose="020B0604020202020204" pitchFamily="34" charset="0"/>
+                  <a:cs typeface="Arial" panose="020B0604020202020204" pitchFamily="34" charset="0"/>
+                </a:endParaRPr>
+              </a:p>
+              <a:p>
+                <a:pPr marL="0" indent="0">
+                  <a:buNone/>
+                </a:pPr>
+                <a:r>
+                  <a:rPr lang="en-US" sz="2000" dirty="0">
+                    <a:latin typeface="Arial" panose="020B0604020202020204" pitchFamily="34" charset="0"/>
+                    <a:cs typeface="Arial" panose="020B0604020202020204" pitchFamily="34" charset="0"/>
+                  </a:rPr>
+                  <a:t>4</a:t>
+                </a:r>
+                <a:r>
+                  <a:rPr lang="en-US" sz="2000" dirty="0">
+                    <a:latin typeface="Arial" panose="020B0604020202020204" pitchFamily="34" charset="0"/>
+                    <a:cs typeface="Arial" panose="020B0604020202020204" pitchFamily="34" charset="0"/>
+                  </a:rPr>
+                  <a:t>.</a:t>
+                </a:r>
+                <a14:m>
+                  <m:oMath xmlns:m="http://schemas.openxmlformats.org/officeDocument/2006/math">
+                    <m:r>
+                      <a:rPr lang="en-US" sz="2000" b="0" i="0" dirty="0" smtClean="0">
+                        <a:solidFill>
+                          <a:schemeClr val="tx1"/>
+                        </a:solidFill>
+                        <a:latin typeface="Cambria Math" panose="02040503050406030204" pitchFamily="18" charset="0"/>
+                        <a:cs typeface="Arial" panose="020B0604020202020204" pitchFamily="34" charset="0"/>
+                      </a:rPr>
+                      <m:t>  </m:t>
+                    </m:r>
+                    <m:r>
+                      <m:rPr>
+                        <m:sty m:val="p"/>
+                      </m:rPr>
+                      <a:rPr lang="en-US" sz="2000" i="0" dirty="0" smtClean="0">
+                        <a:solidFill>
+                          <a:schemeClr val="tx1"/>
+                        </a:solidFill>
+                        <a:latin typeface="Cambria Math" panose="02040503050406030204" pitchFamily="18" charset="0"/>
+                        <a:cs typeface="Arial" panose="020B0604020202020204" pitchFamily="34" charset="0"/>
+                      </a:rPr>
+                      <m:t>X</m:t>
+                    </m:r>
+                    <m:d>
+                      <m:dPr>
+                        <m:begChr m:val="["/>
+                        <m:endChr m:val="]"/>
+                        <m:ctrlPr>
+                          <a:rPr lang="en-US" sz="2000" dirty="0" smtClean="0">
+                            <a:solidFill>
+                              <a:schemeClr val="tx1"/>
+                            </a:solidFill>
+                            <a:latin typeface="Cambria Math" panose="02040503050406030204" pitchFamily="18" charset="0"/>
+                            <a:cs typeface="Arial" panose="020B0604020202020204" pitchFamily="34" charset="0"/>
+                          </a:rPr>
+                        </m:ctrlPr>
+                      </m:dPr>
+                      <m:e>
+                        <m:r>
+                          <m:rPr>
+                            <m:sty m:val="p"/>
+                          </m:rPr>
+                          <a:rPr lang="en-US" sz="2000" i="0" dirty="0" err="1" smtClean="0">
+                            <a:solidFill>
+                              <a:schemeClr val="tx1"/>
+                            </a:solidFill>
+                            <a:latin typeface="Cambria Math" panose="02040503050406030204" pitchFamily="18" charset="0"/>
+                            <a:cs typeface="Arial" panose="020B0604020202020204" pitchFamily="34" charset="0"/>
+                          </a:rPr>
+                          <m:t>i</m:t>
+                        </m:r>
+                      </m:e>
+                    </m:d>
+                    <m:r>
+                      <a:rPr lang="en-US" sz="2000" b="0" i="0" dirty="0" smtClean="0">
+                        <a:solidFill>
+                          <a:schemeClr val="tx1"/>
+                        </a:solidFill>
+                        <a:latin typeface="Cambria Math" panose="02040503050406030204" pitchFamily="18" charset="0"/>
+                        <a:cs typeface="Arial" panose="020B0604020202020204" pitchFamily="34" charset="0"/>
+                      </a:rPr>
+                      <m:t>=</m:t>
+                    </m:r>
+                    <m:r>
+                      <m:rPr>
+                        <m:sty m:val="p"/>
+                      </m:rPr>
+                      <a:rPr lang="en-US" sz="2000" b="0" i="0" dirty="0" smtClean="0">
+                        <a:solidFill>
+                          <a:schemeClr val="tx1"/>
+                        </a:solidFill>
+                        <a:latin typeface="Cambria Math" panose="02040503050406030204" pitchFamily="18" charset="0"/>
+                        <a:cs typeface="Arial" panose="020B0604020202020204" pitchFamily="34" charset="0"/>
+                      </a:rPr>
+                      <m:t>j</m:t>
+                    </m:r>
+                    <m:r>
+                      <a:rPr lang="en-US" sz="2000" i="0" dirty="0" smtClean="0">
+                        <a:solidFill>
+                          <a:schemeClr val="tx1"/>
+                        </a:solidFill>
+                        <a:latin typeface="Cambria Math" panose="02040503050406030204" pitchFamily="18" charset="0"/>
+                        <a:cs typeface="Arial" panose="020B0604020202020204" pitchFamily="34" charset="0"/>
+                      </a:rPr>
+                      <m:t> </m:t>
+                    </m:r>
+                    <m:r>
+                      <a:rPr lang="en-US" sz="2000" i="0" dirty="0" smtClean="0">
+                        <a:solidFill>
+                          <a:schemeClr val="tx1"/>
+                        </a:solidFill>
+                        <a:latin typeface="Cambria Math" panose="02040503050406030204" pitchFamily="18" charset="0"/>
+                        <a:cs typeface="Arial" panose="020B0604020202020204" pitchFamily="34" charset="0"/>
+                        <a:sym typeface="Wingdings" panose="05000000000000000000" pitchFamily="2" charset="2"/>
+                      </a:rPr>
+                      <m:t> </m:t>
+                    </m:r>
+                    <m:r>
+                      <m:rPr>
+                        <m:sty m:val="p"/>
+                      </m:rPr>
+                      <a:rPr lang="en-US" sz="2000" i="0" dirty="0" smtClean="0">
+                        <a:solidFill>
+                          <a:schemeClr val="tx1"/>
+                        </a:solidFill>
+                        <a:latin typeface="Cambria Math" panose="02040503050406030204" pitchFamily="18" charset="0"/>
+                        <a:cs typeface="Arial" panose="020B0604020202020204" pitchFamily="34" charset="0"/>
+                        <a:sym typeface="Wingdings" panose="05000000000000000000" pitchFamily="2" charset="2"/>
+                      </a:rPr>
+                      <m:t>Y</m:t>
+                    </m:r>
+                    <m:d>
+                      <m:dPr>
+                        <m:begChr m:val="["/>
+                        <m:endChr m:val="]"/>
+                        <m:ctrlPr>
+                          <a:rPr lang="en-US" sz="2000" i="0" dirty="0" smtClean="0">
+                            <a:solidFill>
+                              <a:schemeClr val="tx1"/>
+                            </a:solidFill>
+                            <a:latin typeface="Cambria Math" panose="02040503050406030204" pitchFamily="18" charset="0"/>
+                            <a:cs typeface="Arial" panose="020B0604020202020204" pitchFamily="34" charset="0"/>
+                            <a:sym typeface="Wingdings" panose="05000000000000000000" pitchFamily="2" charset="2"/>
+                          </a:rPr>
+                        </m:ctrlPr>
+                      </m:dPr>
+                      <m:e>
+                        <m:r>
+                          <m:rPr>
+                            <m:sty m:val="p"/>
+                          </m:rPr>
+                          <a:rPr lang="en-US" sz="2000" i="0" dirty="0" err="1" smtClean="0">
+                            <a:solidFill>
+                              <a:schemeClr val="tx1"/>
+                            </a:solidFill>
+                            <a:latin typeface="Cambria Math" panose="02040503050406030204" pitchFamily="18" charset="0"/>
+                            <a:cs typeface="Arial" panose="020B0604020202020204" pitchFamily="34" charset="0"/>
+                            <a:sym typeface="Wingdings" panose="05000000000000000000" pitchFamily="2" charset="2"/>
+                          </a:rPr>
+                          <m:t>i</m:t>
+                        </m:r>
+                      </m:e>
+                    </m:d>
+                    <m:r>
+                      <a:rPr lang="en-US" sz="2000" i="0" dirty="0" smtClean="0">
+                        <a:solidFill>
+                          <a:schemeClr val="tx1"/>
+                        </a:solidFill>
+                        <a:latin typeface="Cambria Math" panose="02040503050406030204" pitchFamily="18" charset="0"/>
+                        <a:cs typeface="Arial" panose="020B0604020202020204" pitchFamily="34" charset="0"/>
+                        <a:sym typeface="Wingdings" panose="05000000000000000000" pitchFamily="2" charset="2"/>
+                      </a:rPr>
+                      <m:t>+ </m:t>
+                    </m:r>
+                    <m:r>
+                      <m:rPr>
+                        <m:sty m:val="p"/>
+                      </m:rPr>
+                      <a:rPr lang="en-US" sz="2000" i="0" dirty="0" smtClean="0">
+                        <a:solidFill>
+                          <a:schemeClr val="tx1"/>
+                        </a:solidFill>
+                        <a:latin typeface="Cambria Math" panose="02040503050406030204" pitchFamily="18" charset="0"/>
+                        <a:cs typeface="Arial" panose="020B0604020202020204" pitchFamily="34" charset="0"/>
+                        <a:sym typeface="Wingdings" panose="05000000000000000000" pitchFamily="2" charset="2"/>
+                      </a:rPr>
+                      <m:t>Y</m:t>
+                    </m:r>
+                    <m:d>
+                      <m:dPr>
+                        <m:begChr m:val="["/>
+                        <m:endChr m:val="]"/>
+                        <m:ctrlPr>
+                          <a:rPr lang="en-US" sz="2000" i="0" dirty="0" smtClean="0">
+                            <a:solidFill>
+                              <a:schemeClr val="tx1"/>
+                            </a:solidFill>
+                            <a:latin typeface="Cambria Math" panose="02040503050406030204" pitchFamily="18" charset="0"/>
+                            <a:cs typeface="Arial" panose="020B0604020202020204" pitchFamily="34" charset="0"/>
+                            <a:sym typeface="Wingdings" panose="05000000000000000000" pitchFamily="2" charset="2"/>
+                          </a:rPr>
+                        </m:ctrlPr>
+                      </m:dPr>
+                      <m:e>
+                        <m:r>
+                          <m:rPr>
+                            <m:sty m:val="p"/>
+                          </m:rPr>
+                          <a:rPr lang="en-US" sz="2000" i="0" dirty="0" smtClean="0">
+                            <a:solidFill>
+                              <a:schemeClr val="tx1"/>
+                            </a:solidFill>
+                            <a:latin typeface="Cambria Math" panose="02040503050406030204" pitchFamily="18" charset="0"/>
+                            <a:cs typeface="Arial" panose="020B0604020202020204" pitchFamily="34" charset="0"/>
+                            <a:sym typeface="Wingdings" panose="05000000000000000000" pitchFamily="2" charset="2"/>
+                          </a:rPr>
+                          <m:t>j</m:t>
+                        </m:r>
+                      </m:e>
+                    </m:d>
+                    <m:r>
+                      <a:rPr lang="en-US" sz="2000" i="0" dirty="0" smtClean="0">
+                        <a:solidFill>
+                          <a:schemeClr val="tx1"/>
+                        </a:solidFill>
+                        <a:latin typeface="Cambria Math" panose="02040503050406030204" pitchFamily="18" charset="0"/>
+                        <a:cs typeface="Arial" panose="020B0604020202020204" pitchFamily="34" charset="0"/>
+                        <a:sym typeface="Wingdings" panose="05000000000000000000" pitchFamily="2" charset="2"/>
+                      </a:rPr>
+                      <m:t>= 2 </m:t>
+                    </m:r>
+                    <m:r>
+                      <m:rPr>
+                        <m:sty m:val="p"/>
+                      </m:rPr>
+                      <a:rPr lang="en-US" sz="2000" i="0" dirty="0" err="1" smtClean="0">
+                        <a:solidFill>
+                          <a:schemeClr val="tx1"/>
+                        </a:solidFill>
+                        <a:latin typeface="Cambria Math" panose="02040503050406030204" pitchFamily="18" charset="0"/>
+                        <a:cs typeface="Arial" panose="020B0604020202020204" pitchFamily="34" charset="0"/>
+                        <a:sym typeface="Wingdings" panose="05000000000000000000" pitchFamily="2" charset="2"/>
+                      </a:rPr>
+                      <m:t>v</m:t>
+                    </m:r>
+                    <m:r>
+                      <a:rPr lang="en-US" sz="2000" i="0" dirty="0" err="1" smtClean="0">
+                        <a:solidFill>
+                          <a:schemeClr val="tx1"/>
+                        </a:solidFill>
+                        <a:latin typeface="Cambria Math" panose="02040503050406030204" pitchFamily="18" charset="0"/>
+                        <a:cs typeface="Arial" panose="020B0604020202020204" pitchFamily="34" charset="0"/>
+                        <a:sym typeface="Wingdings" panose="05000000000000000000" pitchFamily="2" charset="2"/>
+                      </a:rPr>
+                      <m:t>ớ</m:t>
+                    </m:r>
+                    <m:r>
+                      <m:rPr>
+                        <m:sty m:val="p"/>
+                      </m:rPr>
+                      <a:rPr lang="en-US" sz="2000" i="0" dirty="0" err="1" smtClean="0">
+                        <a:solidFill>
+                          <a:schemeClr val="tx1"/>
+                        </a:solidFill>
+                        <a:latin typeface="Cambria Math" panose="02040503050406030204" pitchFamily="18" charset="0"/>
+                        <a:cs typeface="Arial" panose="020B0604020202020204" pitchFamily="34" charset="0"/>
+                        <a:sym typeface="Wingdings" panose="05000000000000000000" pitchFamily="2" charset="2"/>
+                      </a:rPr>
+                      <m:t>i</m:t>
+                    </m:r>
+                    <m:r>
+                      <a:rPr lang="en-US" sz="2000" i="0" dirty="0" smtClean="0">
+                        <a:solidFill>
+                          <a:schemeClr val="tx1"/>
+                        </a:solidFill>
+                        <a:latin typeface="Cambria Math" panose="02040503050406030204" pitchFamily="18" charset="0"/>
+                        <a:cs typeface="Arial" panose="020B0604020202020204" pitchFamily="34" charset="0"/>
+                        <a:sym typeface="Wingdings" panose="05000000000000000000" pitchFamily="2" charset="2"/>
+                      </a:rPr>
+                      <m:t> </m:t>
+                    </m:r>
+                    <m:r>
+                      <a:rPr lang="en-GB" sz="2000" i="0" dirty="0" smtClean="0">
+                        <a:latin typeface="Cambria Math" panose="02040503050406030204" pitchFamily="18" charset="0"/>
+                        <a:cs typeface="Arial" panose="020B0604020202020204" pitchFamily="34" charset="0"/>
+                        <a:sym typeface="Symbol" panose="05050102010706020507" pitchFamily="18" charset="2"/>
+                      </a:rPr>
+                      <m:t></m:t>
+                    </m:r>
+                    <m:r>
+                      <a:rPr lang="en-US" sz="2000" i="0" dirty="0" smtClean="0">
+                        <a:solidFill>
+                          <a:schemeClr val="tx1"/>
+                        </a:solidFill>
+                        <a:latin typeface="Cambria Math" panose="02040503050406030204" pitchFamily="18" charset="0"/>
+                        <a:cs typeface="Arial" panose="020B0604020202020204" pitchFamily="34" charset="0"/>
+                        <a:sym typeface="Wingdings" panose="05000000000000000000" pitchFamily="2" charset="2"/>
+                      </a:rPr>
+                      <m:t> </m:t>
+                    </m:r>
+                    <m:r>
+                      <m:rPr>
+                        <m:sty m:val="p"/>
+                      </m:rPr>
+                      <a:rPr lang="en-US" sz="2000" i="0" dirty="0" err="1" smtClean="0">
+                        <a:solidFill>
+                          <a:schemeClr val="tx1"/>
+                        </a:solidFill>
+                        <a:latin typeface="Cambria Math" panose="02040503050406030204" pitchFamily="18" charset="0"/>
+                        <a:cs typeface="Arial" panose="020B0604020202020204" pitchFamily="34" charset="0"/>
+                        <a:sym typeface="Wingdings" panose="05000000000000000000" pitchFamily="2" charset="2"/>
+                      </a:rPr>
+                      <m:t>i</m:t>
+                    </m:r>
+                    <m:r>
+                      <a:rPr lang="en-US" sz="2000" i="0" dirty="0" smtClean="0">
+                        <a:solidFill>
+                          <a:schemeClr val="tx1"/>
+                        </a:solidFill>
+                        <a:latin typeface="Cambria Math" panose="02040503050406030204" pitchFamily="18" charset="0"/>
+                        <a:cs typeface="Arial" panose="020B0604020202020204" pitchFamily="34" charset="0"/>
+                        <a:sym typeface="Wingdings" panose="05000000000000000000" pitchFamily="2" charset="2"/>
+                      </a:rPr>
+                      <m:t> =</m:t>
+                    </m:r>
+                    <m:r>
+                      <a:rPr lang="en-US" sz="2000" b="0" i="0" dirty="0" smtClean="0">
+                        <a:solidFill>
+                          <a:schemeClr val="tx1"/>
+                        </a:solidFill>
+                        <a:latin typeface="Cambria Math" panose="02040503050406030204" pitchFamily="18" charset="0"/>
+                        <a:cs typeface="Arial" panose="020B0604020202020204" pitchFamily="34" charset="0"/>
+                        <a:sym typeface="Wingdings" panose="05000000000000000000" pitchFamily="2" charset="2"/>
+                      </a:rPr>
+                      <m:t>0</m:t>
+                    </m:r>
+                    <m:r>
+                      <a:rPr lang="en-US" sz="2000" i="0" dirty="0" smtClean="0">
+                        <a:solidFill>
+                          <a:schemeClr val="tx1"/>
+                        </a:solidFill>
+                        <a:latin typeface="Cambria Math" panose="02040503050406030204" pitchFamily="18" charset="0"/>
+                        <a:cs typeface="Arial" panose="020B0604020202020204" pitchFamily="34" charset="0"/>
+                        <a:sym typeface="Wingdings" panose="05000000000000000000" pitchFamily="2" charset="2"/>
+                      </a:rPr>
+                      <m:t>…</m:t>
+                    </m:r>
+                    <m:r>
+                      <m:rPr>
+                        <m:sty m:val="p"/>
+                      </m:rPr>
+                      <a:rPr lang="en-US" sz="2000" i="0" dirty="0" smtClean="0">
+                        <a:solidFill>
+                          <a:schemeClr val="tx1"/>
+                        </a:solidFill>
+                        <a:latin typeface="Cambria Math" panose="02040503050406030204" pitchFamily="18" charset="0"/>
+                        <a:cs typeface="Arial" panose="020B0604020202020204" pitchFamily="34" charset="0"/>
+                        <a:sym typeface="Wingdings" panose="05000000000000000000" pitchFamily="2" charset="2"/>
+                      </a:rPr>
+                      <m:t>M</m:t>
+                    </m:r>
+                    <m:r>
+                      <a:rPr lang="en-US" sz="2000" b="0" i="0" dirty="0" smtClean="0">
+                        <a:solidFill>
+                          <a:schemeClr val="tx1"/>
+                        </a:solidFill>
+                        <a:latin typeface="Cambria Math" panose="02040503050406030204" pitchFamily="18" charset="0"/>
+                        <a:cs typeface="Arial" panose="020B0604020202020204" pitchFamily="34" charset="0"/>
+                        <a:sym typeface="Wingdings" panose="05000000000000000000" pitchFamily="2" charset="2"/>
+                      </a:rPr>
+                      <m:t>, </m:t>
+                    </m:r>
+                    <m:r>
+                      <m:rPr>
+                        <m:sty m:val="p"/>
+                      </m:rPr>
+                      <a:rPr lang="en-US" sz="2000" b="0" i="0" dirty="0" smtClean="0">
+                        <a:solidFill>
+                          <a:schemeClr val="tx1"/>
+                        </a:solidFill>
+                        <a:latin typeface="Cambria Math" panose="02040503050406030204" pitchFamily="18" charset="0"/>
+                        <a:cs typeface="Arial" panose="020B0604020202020204" pitchFamily="34" charset="0"/>
+                        <a:sym typeface="Wingdings" panose="05000000000000000000" pitchFamily="2" charset="2"/>
+                      </a:rPr>
+                      <m:t>j</m:t>
+                    </m:r>
+                    <m:r>
+                      <a:rPr lang="en-US" sz="2000" b="0" i="0" dirty="0" smtClean="0">
+                        <a:solidFill>
+                          <a:schemeClr val="tx1"/>
+                        </a:solidFill>
+                        <a:latin typeface="Cambria Math" panose="02040503050406030204" pitchFamily="18" charset="0"/>
+                        <a:cs typeface="Arial" panose="020B0604020202020204" pitchFamily="34" charset="0"/>
+                        <a:sym typeface="Wingdings" panose="05000000000000000000" pitchFamily="2" charset="2"/>
+                      </a:rPr>
+                      <m:t>=1..</m:t>
+                    </m:r>
+                    <m:r>
+                      <m:rPr>
+                        <m:sty m:val="p"/>
+                      </m:rPr>
+                      <a:rPr lang="en-US" sz="2000" b="0" i="0" dirty="0" smtClean="0">
+                        <a:solidFill>
+                          <a:schemeClr val="tx1"/>
+                        </a:solidFill>
+                        <a:latin typeface="Cambria Math" panose="02040503050406030204" pitchFamily="18" charset="0"/>
+                        <a:cs typeface="Arial" panose="020B0604020202020204" pitchFamily="34" charset="0"/>
+                        <a:sym typeface="Wingdings" panose="05000000000000000000" pitchFamily="2" charset="2"/>
+                      </a:rPr>
+                      <m:t>M</m:t>
+                    </m:r>
+                    <m:r>
+                      <a:rPr lang="en-US" sz="2000" b="0" i="0" dirty="0" smtClean="0">
+                        <a:solidFill>
+                          <a:schemeClr val="tx1"/>
+                        </a:solidFill>
+                        <a:latin typeface="Cambria Math" panose="02040503050406030204" pitchFamily="18" charset="0"/>
+                        <a:cs typeface="Arial" panose="020B0604020202020204" pitchFamily="34" charset="0"/>
+                        <a:sym typeface="Wingdings" panose="05000000000000000000" pitchFamily="2" charset="2"/>
+                      </a:rPr>
+                      <m:t>+1,  </m:t>
+                    </m:r>
+                    <m:r>
+                      <m:rPr>
+                        <m:sty m:val="p"/>
+                      </m:rPr>
+                      <a:rPr lang="en-US" sz="2000" i="0" dirty="0" err="1" smtClean="0">
+                        <a:solidFill>
+                          <a:schemeClr val="tx1"/>
+                        </a:solidFill>
+                        <a:latin typeface="Cambria Math" panose="02040503050406030204" pitchFamily="18" charset="0"/>
+                        <a:cs typeface="Arial" panose="020B0604020202020204" pitchFamily="34" charset="0"/>
+                        <a:sym typeface="Wingdings" panose="05000000000000000000" pitchFamily="2" charset="2"/>
+                      </a:rPr>
+                      <m:t>i</m:t>
+                    </m:r>
+                    <m:r>
+                      <a:rPr lang="en-US" sz="2000" i="0" dirty="0" smtClean="0">
+                        <a:solidFill>
+                          <a:schemeClr val="tx1"/>
+                        </a:solidFill>
+                        <a:latin typeface="Cambria Math" panose="02040503050406030204" pitchFamily="18" charset="0"/>
+                        <a:cs typeface="Arial" panose="020B0604020202020204" pitchFamily="34" charset="0"/>
+                        <a:sym typeface="Wingdings" panose="05000000000000000000" pitchFamily="2" charset="2"/>
+                      </a:rPr>
+                      <m:t> ≠ </m:t>
+                    </m:r>
+                    <m:r>
+                      <m:rPr>
+                        <m:sty m:val="p"/>
+                      </m:rPr>
+                      <a:rPr lang="en-US" sz="2000" i="0" dirty="0" smtClean="0">
+                        <a:solidFill>
+                          <a:schemeClr val="tx1"/>
+                        </a:solidFill>
+                        <a:latin typeface="Cambria Math" panose="02040503050406030204" pitchFamily="18" charset="0"/>
+                        <a:cs typeface="Arial" panose="020B0604020202020204" pitchFamily="34" charset="0"/>
+                        <a:sym typeface="Wingdings" panose="05000000000000000000" pitchFamily="2" charset="2"/>
+                      </a:rPr>
+                      <m:t>j</m:t>
+                    </m:r>
+                  </m:oMath>
+                </a14:m>
+                <a:endParaRPr lang="en-US" dirty="0">
+                  <a:latin typeface="Arial" panose="020B0604020202020204" pitchFamily="34" charset="0"/>
+                  <a:cs typeface="Arial" panose="020B0604020202020204" pitchFamily="34" charset="0"/>
+                </a:endParaRPr>
+              </a:p>
+              <a:p>
+                <a:pPr lvl="1"/>
+                <a:endParaRPr lang="en-US" dirty="0">
+                  <a:latin typeface="Arial" panose="020B0604020202020204" pitchFamily="34" charset="0"/>
+                  <a:cs typeface="Arial" panose="020B0604020202020204" pitchFamily="34" charset="0"/>
+                </a:endParaRPr>
+              </a:p>
+              <a:p>
+                <a:pPr lvl="1"/>
+                <a:endParaRPr lang="en-GB" dirty="0">
+                  <a:latin typeface="Times New Roman" pitchFamily="18" charset="0"/>
+                  <a:cs typeface="Times New Roman" pitchFamily="18" charset="0"/>
+                </a:endParaRPr>
+              </a:p>
+            </p:txBody>
+          </p:sp>
+        </mc:Choice>
+        <mc:Fallback>
+          <p:sp>
+            <p:nvSpPr>
+              <p:cNvPr id="3" name="Content Placeholder 2"/>
+              <p:cNvSpPr>
+                <a:spLocks noGrp="1" noRot="1" noChangeAspect="1" noMove="1" noResize="1" noEditPoints="1" noAdjustHandles="1" noChangeArrowheads="1" noChangeShapeType="1" noTextEdit="1"/>
+              </p:cNvSpPr>
+              <p:nvPr>
+                <p:ph idx="1"/>
+              </p:nvPr>
+            </p:nvSpPr>
+            <p:spPr>
+              <a:xfrm>
+                <a:off x="1847528" y="1447800"/>
+                <a:ext cx="8568952" cy="5005536"/>
+              </a:xfrm>
+              <a:blipFill>
+                <a:blip r:embed="rId3"/>
+                <a:stretch>
+                  <a:fillRect l="-1280" t="-2192"/>
+                </a:stretch>
+              </a:blipFill>
+            </p:spPr>
+            <p:txBody>
+              <a:bodyPr/>
+              <a:lstStyle/>
+              <a:p>
+                <a:r>
+                  <a:rPr lang="en-US">
+                    <a:noFill/>
+                  </a:rPr>
+                  <a:t> </a:t>
+                </a:r>
+              </a:p>
+            </p:txBody>
+          </p:sp>
+        </mc:Fallback>
+      </mc:AlternateContent>
+      <p:sp>
+        <p:nvSpPr>
+          <p:cNvPr id="4" name="Slide Number Placeholder 3"/>
+          <p:cNvSpPr>
+            <a:spLocks noGrp="1"/>
+          </p:cNvSpPr>
+          <p:nvPr>
+            <p:ph type="sldNum" sz="quarter" idx="12"/>
+          </p:nvPr>
+        </p:nvSpPr>
+        <p:spPr/>
+        <p:txBody>
+          <a:bodyPr/>
+          <a:lstStyle/>
+          <a:p>
+            <a:fld id="{A5B08488-2DBE-4E62-B7EE-BA7D2927C7BD}" type="slidenum">
+              <a:rPr lang="en-GB" smtClean="0"/>
+              <a:t>9</a:t>
+            </a:fld>
+            <a:endParaRPr lang="en-GB"/>
+          </a:p>
+        </p:txBody>
+      </p:sp>
+      <p:cxnSp>
+        <p:nvCxnSpPr>
+          <p:cNvPr id="5" name="Straight Connector 4"/>
+          <p:cNvCxnSpPr/>
+          <p:nvPr/>
+        </p:nvCxnSpPr>
+        <p:spPr>
+          <a:xfrm>
+            <a:off x="1847528" y="1268760"/>
+            <a:ext cx="8640960" cy="0"/>
+          </a:xfrm>
+          <a:prstGeom prst="line">
+            <a:avLst/>
+          </a:prstGeom>
+          <a:ln w="25400">
+            <a:solidFill>
+              <a:schemeClr val="accent1">
+                <a:lumMod val="60000"/>
+                <a:lumOff val="40000"/>
+              </a:schemeClr>
+            </a:solidFill>
+          </a:ln>
+        </p:spPr>
+        <p:style>
+          <a:lnRef idx="1">
+            <a:schemeClr val="accent1"/>
+          </a:lnRef>
+          <a:fillRef idx="0">
+            <a:schemeClr val="accent1"/>
+          </a:fillRef>
+          <a:effectRef idx="0">
+            <a:schemeClr val="accent1"/>
+          </a:effectRef>
+          <a:fontRef idx="minor">
+            <a:schemeClr val="tx1"/>
+          </a:fontRef>
+        </p:style>
+      </p:cxnSp>
+    </p:spTree>
+    <p:extLst>
+      <p:ext uri="{BB962C8B-B14F-4D97-AF65-F5344CB8AC3E}">
+        <p14:creationId xmlns:p14="http://schemas.microsoft.com/office/powerpoint/2010/main" val="3922080250"/>
       </p:ext>
     </p:extLst>
   </p:cSld>

</xml_diff>

<commit_message>
add add data, update slide
</commit_message>
<xml_diff>
--- a/project.pptx
+++ b/project.pptx
@@ -206,7 +206,7 @@
           <a:p>
             <a:fld id="{96F24957-8CAA-48B8-845F-4771C4C8EBBD}" type="datetimeFigureOut">
               <a:rPr lang="en-US" smtClean="0"/>
-              <a:t>5/16/2021</a:t>
+              <a:t>5/18/2021</a:t>
             </a:fld>
             <a:endParaRPr lang="en-US"/>
           </a:p>
@@ -1379,7 +1379,7 @@
           <a:p>
             <a:fld id="{73EE8F9C-57C7-4DD6-8B35-7D3273B02C02}" type="datetimeFigureOut">
               <a:rPr lang="en-US" smtClean="0"/>
-              <a:t>5/16/2021</a:t>
+              <a:t>5/18/2021</a:t>
             </a:fld>
             <a:endParaRPr lang="en-US"/>
           </a:p>
@@ -1579,7 +1579,7 @@
           <a:p>
             <a:fld id="{73EE8F9C-57C7-4DD6-8B35-7D3273B02C02}" type="datetimeFigureOut">
               <a:rPr lang="en-US" smtClean="0"/>
-              <a:t>5/16/2021</a:t>
+              <a:t>5/18/2021</a:t>
             </a:fld>
             <a:endParaRPr lang="en-US"/>
           </a:p>
@@ -1789,7 +1789,7 @@
           <a:p>
             <a:fld id="{73EE8F9C-57C7-4DD6-8B35-7D3273B02C02}" type="datetimeFigureOut">
               <a:rPr lang="en-US" smtClean="0"/>
-              <a:t>5/16/2021</a:t>
+              <a:t>5/18/2021</a:t>
             </a:fld>
             <a:endParaRPr lang="en-US"/>
           </a:p>
@@ -1989,7 +1989,7 @@
           <a:p>
             <a:fld id="{73EE8F9C-57C7-4DD6-8B35-7D3273B02C02}" type="datetimeFigureOut">
               <a:rPr lang="en-US" smtClean="0"/>
-              <a:t>5/16/2021</a:t>
+              <a:t>5/18/2021</a:t>
             </a:fld>
             <a:endParaRPr lang="en-US"/>
           </a:p>
@@ -2265,7 +2265,7 @@
           <a:p>
             <a:fld id="{73EE8F9C-57C7-4DD6-8B35-7D3273B02C02}" type="datetimeFigureOut">
               <a:rPr lang="en-US" smtClean="0"/>
-              <a:t>5/16/2021</a:t>
+              <a:t>5/18/2021</a:t>
             </a:fld>
             <a:endParaRPr lang="en-US"/>
           </a:p>
@@ -2533,7 +2533,7 @@
           <a:p>
             <a:fld id="{73EE8F9C-57C7-4DD6-8B35-7D3273B02C02}" type="datetimeFigureOut">
               <a:rPr lang="en-US" smtClean="0"/>
-              <a:t>5/16/2021</a:t>
+              <a:t>5/18/2021</a:t>
             </a:fld>
             <a:endParaRPr lang="en-US"/>
           </a:p>
@@ -2948,7 +2948,7 @@
           <a:p>
             <a:fld id="{73EE8F9C-57C7-4DD6-8B35-7D3273B02C02}" type="datetimeFigureOut">
               <a:rPr lang="en-US" smtClean="0"/>
-              <a:t>5/16/2021</a:t>
+              <a:t>5/18/2021</a:t>
             </a:fld>
             <a:endParaRPr lang="en-US"/>
           </a:p>
@@ -3090,7 +3090,7 @@
           <a:p>
             <a:fld id="{73EE8F9C-57C7-4DD6-8B35-7D3273B02C02}" type="datetimeFigureOut">
               <a:rPr lang="en-US" smtClean="0"/>
-              <a:t>5/16/2021</a:t>
+              <a:t>5/18/2021</a:t>
             </a:fld>
             <a:endParaRPr lang="en-US"/>
           </a:p>
@@ -3203,7 +3203,7 @@
           <a:p>
             <a:fld id="{73EE8F9C-57C7-4DD6-8B35-7D3273B02C02}" type="datetimeFigureOut">
               <a:rPr lang="en-US" smtClean="0"/>
-              <a:t>5/16/2021</a:t>
+              <a:t>5/18/2021</a:t>
             </a:fld>
             <a:endParaRPr lang="en-US"/>
           </a:p>
@@ -3516,7 +3516,7 @@
           <a:p>
             <a:fld id="{73EE8F9C-57C7-4DD6-8B35-7D3273B02C02}" type="datetimeFigureOut">
               <a:rPr lang="en-US" smtClean="0"/>
-              <a:t>5/16/2021</a:t>
+              <a:t>5/18/2021</a:t>
             </a:fld>
             <a:endParaRPr lang="en-US"/>
           </a:p>
@@ -3805,7 +3805,7 @@
           <a:p>
             <a:fld id="{73EE8F9C-57C7-4DD6-8B35-7D3273B02C02}" type="datetimeFigureOut">
               <a:rPr lang="en-US" smtClean="0"/>
-              <a:t>5/16/2021</a:t>
+              <a:t>5/18/2021</a:t>
             </a:fld>
             <a:endParaRPr lang="en-US"/>
           </a:p>
@@ -4048,7 +4048,7 @@
           <a:p>
             <a:fld id="{73EE8F9C-57C7-4DD6-8B35-7D3273B02C02}" type="datetimeFigureOut">
               <a:rPr lang="en-US" smtClean="0"/>
-              <a:t>5/16/2021</a:t>
+              <a:t>5/18/2021</a:t>
             </a:fld>
             <a:endParaRPr lang="en-US"/>
           </a:p>
@@ -4598,8 +4598,8 @@
           </a:p>
         </p:txBody>
       </p:sp>
-      <mc:AlternateContent xmlns:mc="http://schemas.openxmlformats.org/markup-compatibility/2006">
-        <mc:Choice xmlns:a14="http://schemas.microsoft.com/office/drawing/2010/main" Requires="a14">
+      <mc:AlternateContent xmlns:mc="http://schemas.openxmlformats.org/markup-compatibility/2006" xmlns:a14="http://schemas.microsoft.com/office/drawing/2010/main">
+        <mc:Choice Requires="a14">
           <p:sp>
             <p:nvSpPr>
               <p:cNvPr id="3" name="Content Placeholder 2"/>
@@ -5396,7 +5396,7 @@
             </p:txBody>
           </p:sp>
         </mc:Choice>
-        <mc:Fallback>
+        <mc:Fallback xmlns="">
           <p:sp>
             <p:nvSpPr>
               <p:cNvPr id="3" name="Content Placeholder 2"/>
@@ -16174,8 +16174,8 @@
           </a:p>
         </p:txBody>
       </p:sp>
-      <mc:AlternateContent xmlns:mc="http://schemas.openxmlformats.org/markup-compatibility/2006">
-        <mc:Choice xmlns:a14="http://schemas.microsoft.com/office/drawing/2010/main" Requires="a14">
+      <mc:AlternateContent xmlns:mc="http://schemas.openxmlformats.org/markup-compatibility/2006" xmlns:a14="http://schemas.microsoft.com/office/drawing/2010/main">
+        <mc:Choice Requires="a14">
           <p:sp>
             <p:nvSpPr>
               <p:cNvPr id="3" name="Content Placeholder 2"/>
@@ -16500,21 +16500,7 @@
                     <a:latin typeface="Arial" panose="020B0604020202020204" pitchFamily="34" charset="0"/>
                     <a:cs typeface="Arial" panose="020B0604020202020204" pitchFamily="34" charset="0"/>
                   </a:rPr>
-                  <a:t>≤ </a:t>
-                </a:r>
-                <a:r>
-                  <a:rPr lang="en-US" sz="2000">
-                    <a:latin typeface="Arial" panose="020B0604020202020204" pitchFamily="34" charset="0"/>
-                    <a:cs typeface="Arial" panose="020B0604020202020204" pitchFamily="34" charset="0"/>
-                  </a:rPr>
-                  <a:t>i </a:t>
-                </a:r>
-                <a:r>
-                  <a:rPr lang="en-US" sz="2000">
-                    <a:latin typeface="Arial" panose="020B0604020202020204" pitchFamily="34" charset="0"/>
-                    <a:cs typeface="Arial" panose="020B0604020202020204" pitchFamily="34" charset="0"/>
-                  </a:rPr>
-                  <a:t>&lt;</a:t>
+                  <a:t>≤ i &lt;</a:t>
                 </a:r>
                 <a:r>
                   <a:rPr lang="en-US" sz="2000" smtClean="0">
@@ -16542,14 +16528,7 @@
                     <a:latin typeface="Arial" panose="020B0604020202020204" pitchFamily="34" charset="0"/>
                     <a:cs typeface="Arial" panose="020B0604020202020204" pitchFamily="34" charset="0"/>
                   </a:rPr>
-                  <a:t>4</a:t>
-                </a:r>
-                <a:r>
-                  <a:rPr lang="en-US" sz="2000" dirty="0">
-                    <a:latin typeface="Arial" panose="020B0604020202020204" pitchFamily="34" charset="0"/>
-                    <a:cs typeface="Arial" panose="020B0604020202020204" pitchFamily="34" charset="0"/>
-                  </a:rPr>
-                  <a:t>.</a:t>
+                  <a:t>4.</a:t>
                 </a:r>
                 <a14:m>
                   <m:oMath xmlns:m="http://schemas.openxmlformats.org/officeDocument/2006/math">
@@ -16581,7 +16560,7 @@
                         <m:begChr m:val="["/>
                         <m:endChr m:val="]"/>
                         <m:ctrlPr>
-                          <a:rPr lang="en-US" sz="2000" dirty="0" smtClean="0">
+                          <a:rPr lang="en-US" sz="2000" i="1" dirty="0" smtClean="0">
                             <a:solidFill>
                               <a:schemeClr val="tx1"/>
                             </a:solidFill>
@@ -16669,7 +16648,7 @@
                         <m:begChr m:val="["/>
                         <m:endChr m:val="]"/>
                         <m:ctrlPr>
-                          <a:rPr lang="en-US" sz="2000" i="0" dirty="0" smtClean="0">
+                          <a:rPr lang="en-US" sz="2000" i="1" dirty="0" smtClean="0">
                             <a:solidFill>
                               <a:schemeClr val="tx1"/>
                             </a:solidFill>
@@ -16726,7 +16705,7 @@
                         <m:begChr m:val="["/>
                         <m:endChr m:val="]"/>
                         <m:ctrlPr>
-                          <a:rPr lang="en-US" sz="2000" i="0" dirty="0" smtClean="0">
+                          <a:rPr lang="en-US" sz="2000" i="1" dirty="0" smtClean="0">
                             <a:solidFill>
                               <a:schemeClr val="tx1"/>
                             </a:solidFill>
@@ -17018,7 +16997,7 @@
             </p:txBody>
           </p:sp>
         </mc:Choice>
-        <mc:Fallback>
+        <mc:Fallback xmlns="">
           <p:sp>
             <p:nvSpPr>
               <p:cNvPr id="3" name="Content Placeholder 2"/>

</xml_diff>